<commit_message>
[Docs]: update Progress Report 0912
</commit_message>
<xml_diff>
--- a/非法集资数据生成-shenhao.pptx
+++ b/非法集资数据生成-shenhao.pptx
@@ -199,7 +199,7 @@
           <a:p>
             <a:fld id="{53D04068-1671-4FF2-AF78-FFD7245F1D46}" type="datetimeFigureOut">
               <a:rPr lang="zh-CN" altLang="en-US" smtClean="0"/>
-              <a:t>2024/8/9</a:t>
+              <a:t>2024/9/12</a:t>
             </a:fld>
             <a:endParaRPr lang="zh-CN" altLang="en-US"/>
           </a:p>
@@ -890,7 +890,7 @@
           <a:p>
             <a:fld id="{B354F24D-AFAF-4384-8947-99081EAFA60F}" type="datetimeFigureOut">
               <a:rPr lang="zh-CN" altLang="en-US" smtClean="0"/>
-              <a:t>2024/8/9</a:t>
+              <a:t>2024/9/12</a:t>
             </a:fld>
             <a:endParaRPr lang="zh-CN" altLang="en-US"/>
           </a:p>
@@ -1088,7 +1088,7 @@
           <a:p>
             <a:fld id="{B354F24D-AFAF-4384-8947-99081EAFA60F}" type="datetimeFigureOut">
               <a:rPr lang="zh-CN" altLang="en-US" smtClean="0"/>
-              <a:t>2024/8/9</a:t>
+              <a:t>2024/9/12</a:t>
             </a:fld>
             <a:endParaRPr lang="zh-CN" altLang="en-US"/>
           </a:p>
@@ -1296,7 +1296,7 @@
           <a:p>
             <a:fld id="{B354F24D-AFAF-4384-8947-99081EAFA60F}" type="datetimeFigureOut">
               <a:rPr lang="zh-CN" altLang="en-US" smtClean="0"/>
-              <a:t>2024/8/9</a:t>
+              <a:t>2024/9/12</a:t>
             </a:fld>
             <a:endParaRPr lang="zh-CN" altLang="en-US"/>
           </a:p>
@@ -1494,7 +1494,7 @@
           <a:p>
             <a:fld id="{B354F24D-AFAF-4384-8947-99081EAFA60F}" type="datetimeFigureOut">
               <a:rPr lang="zh-CN" altLang="en-US" smtClean="0"/>
-              <a:t>2024/8/9</a:t>
+              <a:t>2024/9/12</a:t>
             </a:fld>
             <a:endParaRPr lang="zh-CN" altLang="en-US"/>
           </a:p>
@@ -1769,7 +1769,7 @@
           <a:p>
             <a:fld id="{B354F24D-AFAF-4384-8947-99081EAFA60F}" type="datetimeFigureOut">
               <a:rPr lang="zh-CN" altLang="en-US" smtClean="0"/>
-              <a:t>2024/8/9</a:t>
+              <a:t>2024/9/12</a:t>
             </a:fld>
             <a:endParaRPr lang="zh-CN" altLang="en-US"/>
           </a:p>
@@ -2034,7 +2034,7 @@
           <a:p>
             <a:fld id="{B354F24D-AFAF-4384-8947-99081EAFA60F}" type="datetimeFigureOut">
               <a:rPr lang="zh-CN" altLang="en-US" smtClean="0"/>
-              <a:t>2024/8/9</a:t>
+              <a:t>2024/9/12</a:t>
             </a:fld>
             <a:endParaRPr lang="zh-CN" altLang="en-US"/>
           </a:p>
@@ -2446,7 +2446,7 @@
           <a:p>
             <a:fld id="{B354F24D-AFAF-4384-8947-99081EAFA60F}" type="datetimeFigureOut">
               <a:rPr lang="zh-CN" altLang="en-US" smtClean="0"/>
-              <a:t>2024/8/9</a:t>
+              <a:t>2024/9/12</a:t>
             </a:fld>
             <a:endParaRPr lang="zh-CN" altLang="en-US"/>
           </a:p>
@@ -2587,7 +2587,7 @@
           <a:p>
             <a:fld id="{B354F24D-AFAF-4384-8947-99081EAFA60F}" type="datetimeFigureOut">
               <a:rPr lang="zh-CN" altLang="en-US" smtClean="0"/>
-              <a:t>2024/8/9</a:t>
+              <a:t>2024/9/12</a:t>
             </a:fld>
             <a:endParaRPr lang="zh-CN" altLang="en-US"/>
           </a:p>
@@ -2700,7 +2700,7 @@
           <a:p>
             <a:fld id="{B354F24D-AFAF-4384-8947-99081EAFA60F}" type="datetimeFigureOut">
               <a:rPr lang="zh-CN" altLang="en-US" smtClean="0"/>
-              <a:t>2024/8/9</a:t>
+              <a:t>2024/9/12</a:t>
             </a:fld>
             <a:endParaRPr lang="zh-CN" altLang="en-US"/>
           </a:p>
@@ -3011,7 +3011,7 @@
           <a:p>
             <a:fld id="{B354F24D-AFAF-4384-8947-99081EAFA60F}" type="datetimeFigureOut">
               <a:rPr lang="zh-CN" altLang="en-US" smtClean="0"/>
-              <a:t>2024/8/9</a:t>
+              <a:t>2024/9/12</a:t>
             </a:fld>
             <a:endParaRPr lang="zh-CN" altLang="en-US"/>
           </a:p>
@@ -3299,7 +3299,7 @@
           <a:p>
             <a:fld id="{B354F24D-AFAF-4384-8947-99081EAFA60F}" type="datetimeFigureOut">
               <a:rPr lang="zh-CN" altLang="en-US" smtClean="0"/>
-              <a:t>2024/8/9</a:t>
+              <a:t>2024/9/12</a:t>
             </a:fld>
             <a:endParaRPr lang="zh-CN" altLang="en-US"/>
           </a:p>
@@ -3540,7 +3540,7 @@
           <a:p>
             <a:fld id="{B354F24D-AFAF-4384-8947-99081EAFA60F}" type="datetimeFigureOut">
               <a:rPr lang="zh-CN" altLang="en-US" smtClean="0"/>
-              <a:t>2024/8/9</a:t>
+              <a:t>2024/9/12</a:t>
             </a:fld>
             <a:endParaRPr lang="zh-CN" altLang="en-US"/>
           </a:p>
@@ -5223,6 +5223,60 @@
           <a:chExt cx="0" cy="0"/>
         </a:xfrm>
       </p:grpSpPr>
+      <p:sp>
+        <p:nvSpPr>
+          <p:cNvPr id="56" name="圆角矩形 55">
+            <a:extLst>
+              <a:ext uri="{FF2B5EF4-FFF2-40B4-BE49-F238E27FC236}">
+                <a16:creationId xmlns:a16="http://schemas.microsoft.com/office/drawing/2014/main" id="{6D2D9560-D52F-E5AF-7EBF-A3E8CB45D249}"/>
+              </a:ext>
+            </a:extLst>
+          </p:cNvPr>
+          <p:cNvSpPr/>
+          <p:nvPr/>
+        </p:nvSpPr>
+        <p:spPr>
+          <a:xfrm>
+            <a:off x="1086914" y="5571956"/>
+            <a:ext cx="2016899" cy="571315"/>
+          </a:xfrm>
+          <a:prstGeom prst="roundRect">
+            <a:avLst/>
+          </a:prstGeom>
+          <a:solidFill>
+            <a:schemeClr val="bg2">
+              <a:lumMod val="90000"/>
+            </a:schemeClr>
+          </a:solidFill>
+          <a:ln>
+            <a:prstDash val="sysDash"/>
+          </a:ln>
+        </p:spPr>
+        <p:style>
+          <a:lnRef idx="2">
+            <a:schemeClr val="accent1">
+              <a:shade val="15000"/>
+            </a:schemeClr>
+          </a:lnRef>
+          <a:fillRef idx="1">
+            <a:schemeClr val="accent1"/>
+          </a:fillRef>
+          <a:effectRef idx="0">
+            <a:schemeClr val="accent1"/>
+          </a:effectRef>
+          <a:fontRef idx="minor">
+            <a:schemeClr val="lt1"/>
+          </a:fontRef>
+        </p:style>
+        <p:txBody>
+          <a:bodyPr rtlCol="0" anchor="ctr"/>
+          <a:lstStyle/>
+          <a:p>
+            <a:pPr algn="ctr"/>
+            <a:endParaRPr kumimoji="1" lang="zh-CN" altLang="en-US"/>
+          </a:p>
+        </p:txBody>
+      </p:sp>
       <p:grpSp>
         <p:nvGrpSpPr>
           <p:cNvPr id="4" name="组合 3"/>
@@ -5793,10 +5847,10 @@
         </p:nvGrpSpPr>
         <p:grpSpPr>
           <a:xfrm>
-            <a:off x="4463406" y="1157220"/>
-            <a:ext cx="4291193" cy="5153700"/>
+            <a:off x="4463406" y="1157219"/>
+            <a:ext cx="3634015" cy="4128770"/>
             <a:chOff x="4061265" y="887822"/>
-            <a:chExt cx="4263824" cy="4689980"/>
+            <a:chExt cx="3358551" cy="3649082"/>
           </a:xfrm>
         </p:grpSpPr>
         <p:sp>
@@ -5814,7 +5868,7 @@
           <p:spPr>
             <a:xfrm>
               <a:off x="4121911" y="1062149"/>
-              <a:ext cx="4203178" cy="4515653"/>
+              <a:ext cx="3297905" cy="3474755"/>
             </a:xfrm>
             <a:prstGeom prst="roundRect">
               <a:avLst>
@@ -5846,7 +5900,7 @@
             <a:lstStyle/>
             <a:p>
               <a:r>
-                <a:rPr lang="zh-CN" altLang="en-US" sz="900" dirty="0">
+                <a:rPr lang="zh-CN" altLang="en-US" sz="700" dirty="0">
                   <a:solidFill>
                     <a:schemeClr val="tx1"/>
                   </a:solidFill>
@@ -5856,7 +5910,7 @@
                 <a:t>请你扮演一个**</a:t>
               </a:r>
               <a:r>
-                <a:rPr lang="zh-CN" altLang="en-US" sz="900" b="1" dirty="0">
+                <a:rPr lang="zh-CN" altLang="en-US" sz="700" b="1" dirty="0">
                   <a:solidFill>
                     <a:srgbClr val="FF0000"/>
                   </a:solidFill>
@@ -5866,7 +5920,7 @@
                 <a:t>新型非法集资的舆情文本生成器</a:t>
               </a:r>
               <a:r>
-                <a:rPr lang="zh-CN" altLang="en-US" sz="900" dirty="0">
+                <a:rPr lang="zh-CN" altLang="en-US" sz="700" dirty="0">
                   <a:solidFill>
                     <a:schemeClr val="tx1"/>
                   </a:solidFill>
@@ -5877,7 +5931,7 @@
               </a:r>
             </a:p>
             <a:p>
-              <a:endParaRPr lang="zh-CN" altLang="en-US" sz="900" dirty="0">
+              <a:endParaRPr lang="zh-CN" altLang="en-US" sz="700" dirty="0">
                 <a:solidFill>
                   <a:schemeClr val="tx1"/>
                 </a:solidFill>
@@ -5887,7 +5941,7 @@
             </a:p>
             <a:p>
               <a:r>
-                <a:rPr lang="zh-CN" altLang="en-US" sz="900" dirty="0">
+                <a:rPr lang="zh-CN" altLang="en-US" sz="700" dirty="0">
                   <a:solidFill>
                     <a:schemeClr val="tx1"/>
                   </a:solidFill>
@@ -5897,7 +5951,7 @@
                 <a:t>首先基于给定的</a:t>
               </a:r>
               <a:r>
-                <a:rPr lang="zh-CN" altLang="en-US" sz="900" b="1" dirty="0">
+                <a:rPr lang="zh-CN" altLang="en-US" sz="700" b="1" dirty="0">
                   <a:solidFill>
                     <a:srgbClr val="0070C0"/>
                   </a:solidFill>
@@ -5907,7 +5961,7 @@
                 <a:t>标签类别</a:t>
               </a:r>
               <a:r>
-                <a:rPr lang="zh-CN" altLang="en-US" sz="900" dirty="0">
+                <a:rPr lang="zh-CN" altLang="en-US" sz="700" dirty="0">
                   <a:solidFill>
                     <a:schemeClr val="tx1"/>
                   </a:solidFill>
@@ -5917,7 +5971,7 @@
                 <a:t>，</a:t>
               </a:r>
               <a:r>
-                <a:rPr lang="zh-CN" altLang="en-US" sz="900" b="1" dirty="0">
+                <a:rPr lang="zh-CN" altLang="en-US" sz="700" b="1" dirty="0">
                   <a:solidFill>
                     <a:srgbClr val="0070C0"/>
                   </a:solidFill>
@@ -5927,7 +5981,7 @@
                 <a:t>风险点</a:t>
               </a:r>
               <a:r>
-                <a:rPr lang="zh-CN" altLang="en-US" sz="900" dirty="0">
+                <a:rPr lang="zh-CN" altLang="en-US" sz="700" dirty="0">
                   <a:solidFill>
                     <a:schemeClr val="tx1"/>
                   </a:solidFill>
@@ -5937,7 +5991,7 @@
                 <a:t>，生成其相对应的</a:t>
               </a:r>
               <a:r>
-                <a:rPr lang="zh-CN" altLang="en-US" sz="900" dirty="0">
+                <a:rPr lang="zh-CN" altLang="en-US" sz="700" dirty="0">
                   <a:solidFill>
                     <a:schemeClr val="tx1"/>
                   </a:solidFill>
@@ -5950,7 +6004,7 @@
                 <a:t>非法集资舆情文本</a:t>
               </a:r>
               <a:r>
-                <a:rPr lang="zh-CN" altLang="en-US" sz="900" dirty="0">
+                <a:rPr lang="zh-CN" altLang="en-US" sz="700" dirty="0">
                   <a:solidFill>
                     <a:schemeClr val="tx1"/>
                   </a:solidFill>
@@ -5961,7 +6015,7 @@
               </a:r>
             </a:p>
             <a:p>
-              <a:endParaRPr lang="zh-CN" altLang="en-US" sz="900" dirty="0">
+              <a:endParaRPr lang="zh-CN" altLang="en-US" sz="700" dirty="0">
                 <a:solidFill>
                   <a:schemeClr val="tx1"/>
                 </a:solidFill>
@@ -5971,7 +6025,7 @@
             </a:p>
             <a:p>
               <a:r>
-                <a:rPr lang="zh-CN" altLang="en-US" sz="900" dirty="0">
+                <a:rPr lang="zh-CN" altLang="en-US" sz="700" dirty="0">
                   <a:solidFill>
                     <a:schemeClr val="tx1"/>
                   </a:solidFill>
@@ -5981,7 +6035,7 @@
                 <a:t>要求</a:t>
               </a:r>
               <a:r>
-                <a:rPr lang="en-US" altLang="zh-CN" sz="900" dirty="0">
+                <a:rPr lang="en-US" altLang="zh-CN" sz="700" dirty="0">
                   <a:solidFill>
                     <a:schemeClr val="tx1"/>
                   </a:solidFill>
@@ -5993,7 +6047,7 @@
             </a:p>
             <a:p>
               <a:r>
-                <a:rPr lang="en-US" altLang="zh-CN" sz="900" dirty="0">
+                <a:rPr lang="en-US" altLang="zh-CN" sz="700" dirty="0">
                   <a:solidFill>
                     <a:schemeClr val="tx1"/>
                   </a:solidFill>
@@ -6003,7 +6057,7 @@
                 <a:t>1. </a:t>
               </a:r>
               <a:r>
-                <a:rPr lang="zh-CN" altLang="en-US" sz="900" dirty="0">
+                <a:rPr lang="zh-CN" altLang="en-US" sz="700" dirty="0">
                   <a:solidFill>
                     <a:schemeClr val="tx1"/>
                   </a:solidFill>
@@ -6013,7 +6067,7 @@
                 <a:t>舆情文本要尽可能真实且详细，至少包含</a:t>
               </a:r>
               <a:r>
-                <a:rPr lang="en-US" altLang="zh-CN" sz="900" dirty="0">
+                <a:rPr lang="en-US" altLang="zh-CN" sz="700" dirty="0">
                   <a:solidFill>
                     <a:schemeClr val="tx1"/>
                   </a:solidFill>
@@ -6023,7 +6077,7 @@
                 <a:t>350</a:t>
               </a:r>
               <a:r>
-                <a:rPr lang="zh-CN" altLang="en-US" sz="900" dirty="0">
+                <a:rPr lang="zh-CN" altLang="en-US" sz="700" dirty="0">
                   <a:solidFill>
                     <a:schemeClr val="tx1"/>
                   </a:solidFill>
@@ -6035,7 +6089,7 @@
             </a:p>
             <a:p>
               <a:r>
-                <a:rPr lang="en-US" altLang="zh-CN" sz="900" dirty="0">
+                <a:rPr lang="en-US" altLang="zh-CN" sz="700" dirty="0">
                   <a:solidFill>
                     <a:schemeClr val="tx1"/>
                   </a:solidFill>
@@ -6045,7 +6099,7 @@
                 <a:t>2. </a:t>
               </a:r>
               <a:r>
-                <a:rPr lang="zh-CN" altLang="en-US" sz="900" dirty="0">
+                <a:rPr lang="zh-CN" altLang="en-US" sz="700" dirty="0">
                   <a:solidFill>
                     <a:schemeClr val="tx1"/>
                   </a:solidFill>
@@ -6055,7 +6109,7 @@
                 <a:t>舆情文本描述了某一个非法集资主体的相关舆情信息，例如</a:t>
               </a:r>
               <a:r>
-                <a:rPr lang="zh-CN" altLang="en-US" sz="900" dirty="0">
+                <a:rPr lang="zh-CN" altLang="en-US" sz="700" dirty="0">
                   <a:solidFill>
                     <a:schemeClr val="tx1"/>
                   </a:solidFill>
@@ -6068,7 +6122,7 @@
                 <a:t>软件广告、</a:t>
               </a:r>
               <a:r>
-                <a:rPr lang="en" altLang="zh-CN" sz="900" dirty="0">
+                <a:rPr lang="en" altLang="zh-CN" sz="700" dirty="0">
                   <a:solidFill>
                     <a:schemeClr val="tx1"/>
                   </a:solidFill>
@@ -6081,7 +6135,7 @@
                 <a:t>APP</a:t>
               </a:r>
               <a:r>
-                <a:rPr lang="zh-CN" altLang="en-US" sz="900" dirty="0">
+                <a:rPr lang="zh-CN" altLang="en-US" sz="700" dirty="0">
                   <a:solidFill>
                     <a:schemeClr val="tx1"/>
                   </a:solidFill>
@@ -6094,7 +6148,7 @@
                 <a:t>介绍、用户推荐、社会负面舆情等</a:t>
               </a:r>
               <a:r>
-                <a:rPr lang="zh-CN" altLang="en-US" sz="900" dirty="0">
+                <a:rPr lang="zh-CN" altLang="en-US" sz="700" dirty="0">
                   <a:solidFill>
                     <a:schemeClr val="tx1"/>
                   </a:solidFill>
@@ -6106,7 +6160,7 @@
             </a:p>
             <a:p>
               <a:r>
-                <a:rPr lang="en-US" altLang="zh-CN" sz="900" dirty="0">
+                <a:rPr lang="en-US" altLang="zh-CN" sz="700" dirty="0">
                   <a:solidFill>
                     <a:schemeClr val="tx1"/>
                   </a:solidFill>
@@ -6116,7 +6170,7 @@
                 <a:t>3. </a:t>
               </a:r>
               <a:r>
-                <a:rPr lang="zh-CN" altLang="en-US" sz="900" dirty="0">
+                <a:rPr lang="zh-CN" altLang="en-US" sz="700" dirty="0">
                   <a:solidFill>
                     <a:schemeClr val="tx1"/>
                   </a:solidFill>
@@ -6128,7 +6182,7 @@
             </a:p>
             <a:p>
               <a:r>
-                <a:rPr lang="en-US" altLang="zh-CN" sz="900" dirty="0">
+                <a:rPr lang="en-US" altLang="zh-CN" sz="700" dirty="0">
                   <a:solidFill>
                     <a:schemeClr val="tx1"/>
                   </a:solidFill>
@@ -6138,7 +6192,7 @@
                 <a:t>4. </a:t>
               </a:r>
               <a:r>
-                <a:rPr lang="zh-CN" altLang="en-US" sz="900" dirty="0">
+                <a:rPr lang="zh-CN" altLang="en-US" sz="700" dirty="0">
                   <a:solidFill>
                     <a:schemeClr val="tx1"/>
                   </a:solidFill>
@@ -6150,7 +6204,7 @@
             </a:p>
             <a:p>
               <a:r>
-                <a:rPr lang="en-US" altLang="zh-CN" sz="900" dirty="0">
+                <a:rPr lang="en-US" altLang="zh-CN" sz="700" dirty="0">
                   <a:solidFill>
                     <a:schemeClr val="tx1"/>
                   </a:solidFill>
@@ -6160,7 +6214,7 @@
                 <a:t>5. </a:t>
               </a:r>
               <a:r>
-                <a:rPr lang="zh-CN" altLang="en-US" sz="900" dirty="0">
+                <a:rPr lang="zh-CN" altLang="en-US" sz="700" dirty="0">
                   <a:solidFill>
                     <a:schemeClr val="tx1"/>
                   </a:solidFill>
@@ -6171,7 +6225,7 @@
               </a:r>
             </a:p>
             <a:p>
-              <a:endParaRPr lang="zh-CN" altLang="en-US" sz="900" dirty="0">
+              <a:endParaRPr lang="zh-CN" altLang="en-US" sz="700" dirty="0">
                 <a:solidFill>
                   <a:schemeClr val="tx1"/>
                 </a:solidFill>
@@ -6181,7 +6235,7 @@
             </a:p>
             <a:p>
               <a:r>
-                <a:rPr lang="zh-CN" altLang="en-US" sz="900" dirty="0">
+                <a:rPr lang="zh-CN" altLang="en-US" sz="700" dirty="0">
                   <a:solidFill>
                     <a:schemeClr val="tx1"/>
                   </a:solidFill>
@@ -6191,7 +6245,7 @@
                 <a:t>以下给出了不同类型的舆情文本生成</a:t>
               </a:r>
               <a:r>
-                <a:rPr lang="zh-CN" altLang="en-US" sz="900" dirty="0">
+                <a:rPr lang="zh-CN" altLang="en-US" sz="700" dirty="0">
                   <a:solidFill>
                     <a:schemeClr val="tx1"/>
                   </a:solidFill>
@@ -6204,7 +6258,7 @@
                 <a:t>示例</a:t>
               </a:r>
               <a:r>
-                <a:rPr lang="zh-CN" altLang="en-US" sz="900" dirty="0">
+                <a:rPr lang="zh-CN" altLang="en-US" sz="700" dirty="0">
                   <a:solidFill>
                     <a:schemeClr val="tx1"/>
                   </a:solidFill>
@@ -6216,7 +6270,7 @@
             </a:p>
             <a:p>
               <a:r>
-                <a:rPr lang="zh-CN" altLang="en-US" sz="900" dirty="0">
+                <a:rPr lang="zh-CN" altLang="en-US" sz="700" dirty="0">
                   <a:solidFill>
                     <a:schemeClr val="tx1"/>
                   </a:solidFill>
@@ -6226,7 +6280,7 @@
                 <a:t>**</a:t>
               </a:r>
               <a:r>
-                <a:rPr lang="zh-CN" altLang="en-US" sz="900" dirty="0">
+                <a:rPr lang="zh-CN" altLang="en-US" sz="700" dirty="0">
                   <a:solidFill>
                     <a:schemeClr val="tx1"/>
                   </a:solidFill>
@@ -6239,7 +6293,7 @@
                 <a:t>软件广告</a:t>
               </a:r>
               <a:r>
-                <a:rPr lang="zh-CN" altLang="en-US" sz="900" dirty="0">
+                <a:rPr lang="zh-CN" altLang="en-US" sz="700" dirty="0">
                   <a:solidFill>
                     <a:schemeClr val="tx1"/>
                   </a:solidFill>
@@ -6249,7 +6303,7 @@
                 <a:t>**</a:t>
               </a:r>
               <a:r>
-                <a:rPr lang="en-US" altLang="zh-CN" sz="900" dirty="0">
+                <a:rPr lang="en-US" altLang="zh-CN" sz="700" dirty="0">
                   <a:solidFill>
                     <a:schemeClr val="tx1"/>
                   </a:solidFill>
@@ -6259,7 +6313,7 @@
                 <a:t>:</a:t>
               </a:r>
               <a:r>
-                <a:rPr lang="zh-CN" altLang="en-US" sz="900" dirty="0">
+                <a:rPr lang="zh-CN" altLang="en-US" sz="700" dirty="0">
                   <a:solidFill>
                     <a:schemeClr val="tx1"/>
                   </a:solidFill>
@@ -6269,7 +6323,7 @@
                 <a:t> </a:t>
               </a:r>
               <a:r>
-                <a:rPr lang="en-US" altLang="zh-CN" sz="900" dirty="0">
+                <a:rPr lang="en-US" altLang="zh-CN" sz="700" dirty="0">
                   <a:solidFill>
                     <a:schemeClr val="tx1"/>
                   </a:solidFill>
@@ -6279,7 +6333,7 @@
                 <a:t>{</a:t>
               </a:r>
               <a:r>
-                <a:rPr lang="en" altLang="zh-CN" sz="900" dirty="0">
+                <a:rPr lang="en" altLang="zh-CN" sz="700" dirty="0">
                   <a:solidFill>
                     <a:schemeClr val="tx1"/>
                   </a:solidFill>
@@ -6291,7 +6345,7 @@
             </a:p>
             <a:p>
               <a:r>
-                <a:rPr lang="en" altLang="zh-CN" sz="900" dirty="0">
+                <a:rPr lang="en" altLang="zh-CN" sz="700" dirty="0">
                   <a:solidFill>
                     <a:schemeClr val="tx1"/>
                   </a:solidFill>
@@ -6301,7 +6355,7 @@
                 <a:t>**</a:t>
               </a:r>
               <a:r>
-                <a:rPr lang="en" altLang="zh-CN" sz="900" dirty="0">
+                <a:rPr lang="en" altLang="zh-CN" sz="700" dirty="0">
                   <a:solidFill>
                     <a:schemeClr val="tx1"/>
                   </a:solidFill>
@@ -6314,7 +6368,7 @@
                 <a:t>APP</a:t>
               </a:r>
               <a:r>
-                <a:rPr lang="zh-CN" altLang="en-US" sz="900" dirty="0">
+                <a:rPr lang="zh-CN" altLang="en-US" sz="700" dirty="0">
                   <a:solidFill>
                     <a:schemeClr val="tx1"/>
                   </a:solidFill>
@@ -6327,7 +6381,7 @@
                 <a:t>介绍</a:t>
               </a:r>
               <a:r>
-                <a:rPr lang="zh-CN" altLang="en-US" sz="900" dirty="0">
+                <a:rPr lang="zh-CN" altLang="en-US" sz="700" dirty="0">
                   <a:solidFill>
                     <a:schemeClr val="tx1"/>
                   </a:solidFill>
@@ -6337,7 +6391,7 @@
                 <a:t>**</a:t>
               </a:r>
               <a:r>
-                <a:rPr lang="en-US" altLang="zh-CN" sz="900" dirty="0">
+                <a:rPr lang="en-US" altLang="zh-CN" sz="700" dirty="0">
                   <a:solidFill>
                     <a:schemeClr val="tx1"/>
                   </a:solidFill>
@@ -6347,7 +6401,7 @@
                 <a:t>:</a:t>
               </a:r>
               <a:r>
-                <a:rPr lang="zh-CN" altLang="en-US" sz="900" dirty="0">
+                <a:rPr lang="zh-CN" altLang="en-US" sz="700" dirty="0">
                   <a:solidFill>
                     <a:schemeClr val="tx1"/>
                   </a:solidFill>
@@ -6357,7 +6411,7 @@
                 <a:t> </a:t>
               </a:r>
               <a:r>
-                <a:rPr lang="en-US" altLang="zh-CN" sz="900" dirty="0">
+                <a:rPr lang="en-US" altLang="zh-CN" sz="700" dirty="0">
                   <a:solidFill>
                     <a:schemeClr val="tx1"/>
                   </a:solidFill>
@@ -6367,7 +6421,7 @@
                 <a:t>{</a:t>
               </a:r>
               <a:r>
-                <a:rPr lang="en" altLang="zh-CN" sz="900" dirty="0">
+                <a:rPr lang="en" altLang="zh-CN" sz="700" dirty="0">
                   <a:solidFill>
                     <a:schemeClr val="tx1"/>
                   </a:solidFill>
@@ -6379,7 +6433,7 @@
             </a:p>
             <a:p>
               <a:r>
-                <a:rPr lang="en" altLang="zh-CN" sz="900" dirty="0">
+                <a:rPr lang="en" altLang="zh-CN" sz="700" dirty="0">
                   <a:solidFill>
                     <a:schemeClr val="tx1"/>
                   </a:solidFill>
@@ -6389,7 +6443,7 @@
                 <a:t>**</a:t>
               </a:r>
               <a:r>
-                <a:rPr lang="zh-CN" altLang="en-US" sz="900" dirty="0">
+                <a:rPr lang="zh-CN" altLang="en-US" sz="700" dirty="0">
                   <a:solidFill>
                     <a:schemeClr val="tx1"/>
                   </a:solidFill>
@@ -6402,7 +6456,7 @@
                 <a:t>用户推荐</a:t>
               </a:r>
               <a:r>
-                <a:rPr lang="zh-CN" altLang="en-US" sz="900" dirty="0">
+                <a:rPr lang="zh-CN" altLang="en-US" sz="700" dirty="0">
                   <a:solidFill>
                     <a:schemeClr val="tx1"/>
                   </a:solidFill>
@@ -6412,7 +6466,7 @@
                 <a:t>**</a:t>
               </a:r>
               <a:r>
-                <a:rPr lang="en-US" altLang="zh-CN" sz="900" dirty="0">
+                <a:rPr lang="en-US" altLang="zh-CN" sz="700" dirty="0">
                   <a:solidFill>
                     <a:schemeClr val="tx1"/>
                   </a:solidFill>
@@ -6422,7 +6476,7 @@
                 <a:t>:</a:t>
               </a:r>
               <a:r>
-                <a:rPr lang="zh-CN" altLang="en-US" sz="900" dirty="0">
+                <a:rPr lang="zh-CN" altLang="en-US" sz="700" dirty="0">
                   <a:solidFill>
                     <a:schemeClr val="tx1"/>
                   </a:solidFill>
@@ -6432,7 +6486,7 @@
                 <a:t> </a:t>
               </a:r>
               <a:r>
-                <a:rPr lang="en-US" altLang="zh-CN" sz="900" dirty="0">
+                <a:rPr lang="en-US" altLang="zh-CN" sz="700" dirty="0">
                   <a:solidFill>
                     <a:schemeClr val="tx1"/>
                   </a:solidFill>
@@ -6442,7 +6496,7 @@
                 <a:t>{</a:t>
               </a:r>
               <a:r>
-                <a:rPr lang="en" altLang="zh-CN" sz="900" dirty="0">
+                <a:rPr lang="en" altLang="zh-CN" sz="700" dirty="0">
                   <a:solidFill>
                     <a:schemeClr val="tx1"/>
                   </a:solidFill>
@@ -6454,7 +6508,7 @@
             </a:p>
             <a:p>
               <a:r>
-                <a:rPr lang="en" altLang="zh-CN" sz="900" dirty="0">
+                <a:rPr lang="en" altLang="zh-CN" sz="700" dirty="0">
                   <a:solidFill>
                     <a:schemeClr val="tx1"/>
                   </a:solidFill>
@@ -6464,7 +6518,7 @@
                 <a:t>**</a:t>
               </a:r>
               <a:r>
-                <a:rPr lang="zh-CN" altLang="en-US" sz="900" dirty="0">
+                <a:rPr lang="zh-CN" altLang="en-US" sz="700" dirty="0">
                   <a:solidFill>
                     <a:schemeClr val="tx1"/>
                   </a:solidFill>
@@ -6477,7 +6531,7 @@
                 <a:t>社会负面舆情</a:t>
               </a:r>
               <a:r>
-                <a:rPr lang="zh-CN" altLang="en-US" sz="900" dirty="0">
+                <a:rPr lang="zh-CN" altLang="en-US" sz="700" dirty="0">
                   <a:solidFill>
                     <a:schemeClr val="tx1"/>
                   </a:solidFill>
@@ -6487,7 +6541,7 @@
                 <a:t>**</a:t>
               </a:r>
               <a:r>
-                <a:rPr lang="en-US" altLang="zh-CN" sz="900" dirty="0">
+                <a:rPr lang="en-US" altLang="zh-CN" sz="700" dirty="0">
                   <a:solidFill>
                     <a:schemeClr val="tx1"/>
                   </a:solidFill>
@@ -6497,7 +6551,7 @@
                 <a:t>:</a:t>
               </a:r>
               <a:r>
-                <a:rPr lang="zh-CN" altLang="en-US" sz="900" dirty="0">
+                <a:rPr lang="zh-CN" altLang="en-US" sz="700" dirty="0">
                   <a:solidFill>
                     <a:schemeClr val="tx1"/>
                   </a:solidFill>
@@ -6507,7 +6561,7 @@
                 <a:t> </a:t>
               </a:r>
               <a:r>
-                <a:rPr lang="en-US" altLang="zh-CN" sz="900" dirty="0">
+                <a:rPr lang="en-US" altLang="zh-CN" sz="700" dirty="0">
                   <a:solidFill>
                     <a:schemeClr val="tx1"/>
                   </a:solidFill>
@@ -6517,7 +6571,7 @@
                 <a:t>{</a:t>
               </a:r>
               <a:r>
-                <a:rPr lang="en" altLang="zh-CN" sz="900" dirty="0">
+                <a:rPr lang="en" altLang="zh-CN" sz="700" dirty="0">
                   <a:solidFill>
                     <a:schemeClr val="tx1"/>
                   </a:solidFill>
@@ -6529,7 +6583,7 @@
             </a:p>
             <a:p>
               <a:r>
-                <a:rPr lang="en" altLang="zh-CN" sz="900" dirty="0">
+                <a:rPr lang="en" altLang="zh-CN" sz="700" dirty="0">
                   <a:solidFill>
                     <a:schemeClr val="tx1"/>
                   </a:solidFill>
@@ -6539,7 +6593,7 @@
                 <a:t>**</a:t>
               </a:r>
               <a:r>
-                <a:rPr lang="zh-CN" altLang="en-US" sz="900" dirty="0">
+                <a:rPr lang="zh-CN" altLang="en-US" sz="700" dirty="0">
                   <a:solidFill>
                     <a:schemeClr val="tx1"/>
                   </a:solidFill>
@@ -6552,7 +6606,7 @@
                 <a:t>其他</a:t>
               </a:r>
               <a:r>
-                <a:rPr lang="zh-CN" altLang="en-US" sz="900" dirty="0">
+                <a:rPr lang="zh-CN" altLang="en-US" sz="700" dirty="0">
                   <a:solidFill>
                     <a:schemeClr val="tx1"/>
                   </a:solidFill>
@@ -6562,7 +6616,7 @@
                 <a:t>**</a:t>
               </a:r>
               <a:r>
-                <a:rPr lang="en-US" altLang="zh-CN" sz="900" dirty="0">
+                <a:rPr lang="en-US" altLang="zh-CN" sz="700" dirty="0">
                   <a:solidFill>
                     <a:schemeClr val="tx1"/>
                   </a:solidFill>
@@ -6572,7 +6626,7 @@
                 <a:t>:</a:t>
               </a:r>
               <a:r>
-                <a:rPr lang="zh-CN" altLang="en-US" sz="900" dirty="0">
+                <a:rPr lang="zh-CN" altLang="en-US" sz="700" dirty="0">
                   <a:solidFill>
                     <a:schemeClr val="tx1"/>
                   </a:solidFill>
@@ -6582,7 +6636,7 @@
                 <a:t> </a:t>
               </a:r>
               <a:r>
-                <a:rPr lang="en-US" altLang="zh-CN" sz="900" dirty="0">
+                <a:rPr lang="en-US" altLang="zh-CN" sz="700" dirty="0">
                   <a:solidFill>
                     <a:schemeClr val="tx1"/>
                   </a:solidFill>
@@ -6592,7 +6646,7 @@
                 <a:t>{</a:t>
               </a:r>
               <a:r>
-                <a:rPr lang="en" altLang="zh-CN" sz="900" dirty="0">
+                <a:rPr lang="en" altLang="zh-CN" sz="700" dirty="0">
                   <a:solidFill>
                     <a:schemeClr val="tx1"/>
                   </a:solidFill>
@@ -6603,7 +6657,7 @@
               </a:r>
             </a:p>
             <a:p>
-              <a:endParaRPr lang="en" altLang="zh-CN" sz="900" dirty="0">
+              <a:endParaRPr lang="en" altLang="zh-CN" sz="700" dirty="0">
                 <a:solidFill>
                   <a:schemeClr val="tx1"/>
                 </a:solidFill>
@@ -6613,7 +6667,7 @@
             </a:p>
             <a:p>
               <a:r>
-                <a:rPr lang="en" altLang="zh-CN" sz="900" dirty="0">
+                <a:rPr lang="en" altLang="zh-CN" sz="700" dirty="0">
                   <a:solidFill>
                     <a:schemeClr val="tx1"/>
                   </a:solidFill>
@@ -6623,7 +6677,7 @@
                 <a:t>## </a:t>
               </a:r>
               <a:r>
-                <a:rPr lang="zh-CN" altLang="en-US" sz="900" dirty="0">
+                <a:rPr lang="zh-CN" altLang="en-US" sz="700" dirty="0">
                   <a:solidFill>
                     <a:schemeClr val="tx1"/>
                   </a:solidFill>
@@ -6635,7 +6689,7 @@
             </a:p>
             <a:p>
               <a:r>
-                <a:rPr lang="en-US" altLang="zh-CN" sz="900" dirty="0">
+                <a:rPr lang="en-US" altLang="zh-CN" sz="700" dirty="0">
                   <a:solidFill>
                     <a:schemeClr val="tx1"/>
                   </a:solidFill>
@@ -6645,7 +6699,7 @@
                 <a:t>[</a:t>
               </a:r>
               <a:r>
-                <a:rPr lang="zh-CN" altLang="en-US" sz="900" dirty="0">
+                <a:rPr lang="zh-CN" altLang="en-US" sz="700" dirty="0">
                   <a:solidFill>
                     <a:schemeClr val="tx1"/>
                   </a:solidFill>
@@ -6655,7 +6709,7 @@
                 <a:t>标签分类</a:t>
               </a:r>
               <a:r>
-                <a:rPr lang="en-US" altLang="zh-CN" sz="900" dirty="0">
+                <a:rPr lang="en-US" altLang="zh-CN" sz="700" dirty="0">
                   <a:solidFill>
                     <a:schemeClr val="tx1"/>
                   </a:solidFill>
@@ -6665,7 +6719,7 @@
                 <a:t>]: {</a:t>
               </a:r>
               <a:r>
-                <a:rPr lang="en" altLang="zh-CN" sz="900" dirty="0">
+                <a:rPr lang="en" altLang="zh-CN" sz="700" dirty="0">
                   <a:solidFill>
                     <a:schemeClr val="tx1"/>
                   </a:solidFill>
@@ -6677,7 +6731,7 @@
             </a:p>
             <a:p>
               <a:r>
-                <a:rPr lang="en" altLang="zh-CN" sz="900" dirty="0">
+                <a:rPr lang="en" altLang="zh-CN" sz="700" dirty="0">
                   <a:solidFill>
                     <a:schemeClr val="tx1"/>
                   </a:solidFill>
@@ -6687,7 +6741,7 @@
                 <a:t>[</a:t>
               </a:r>
               <a:r>
-                <a:rPr lang="zh-CN" altLang="en-US" sz="900" dirty="0">
+                <a:rPr lang="zh-CN" altLang="en-US" sz="700" dirty="0">
                   <a:solidFill>
                     <a:schemeClr val="tx1"/>
                   </a:solidFill>
@@ -6697,7 +6751,7 @@
                 <a:t>风险点</a:t>
               </a:r>
               <a:r>
-                <a:rPr lang="en-US" altLang="zh-CN" sz="900" dirty="0">
+                <a:rPr lang="en-US" altLang="zh-CN" sz="700" dirty="0">
                   <a:solidFill>
                     <a:schemeClr val="tx1"/>
                   </a:solidFill>
@@ -6707,7 +6761,7 @@
                 <a:t>]: {</a:t>
               </a:r>
               <a:r>
-                <a:rPr lang="en" altLang="zh-CN" sz="900" dirty="0">
+                <a:rPr lang="en" altLang="zh-CN" sz="700" dirty="0">
                   <a:solidFill>
                     <a:schemeClr val="tx1"/>
                   </a:solidFill>
@@ -6719,7 +6773,7 @@
             </a:p>
             <a:p>
               <a:r>
-                <a:rPr lang="en" altLang="zh-CN" sz="900" dirty="0">
+                <a:rPr lang="en" altLang="zh-CN" sz="700" dirty="0">
                   <a:solidFill>
                     <a:schemeClr val="tx1"/>
                   </a:solidFill>
@@ -6729,7 +6783,7 @@
                 <a:t>[</a:t>
               </a:r>
               <a:r>
-                <a:rPr lang="zh-CN" altLang="en-US" sz="900" dirty="0">
+                <a:rPr lang="zh-CN" altLang="en-US" sz="700" dirty="0">
                   <a:solidFill>
                     <a:schemeClr val="tx1"/>
                   </a:solidFill>
@@ -6739,7 +6793,7 @@
                 <a:t>风险详请描述格式</a:t>
               </a:r>
               <a:r>
-                <a:rPr lang="en-US" altLang="zh-CN" sz="900" dirty="0">
+                <a:rPr lang="en-US" altLang="zh-CN" sz="700" dirty="0">
                   <a:solidFill>
                     <a:schemeClr val="tx1"/>
                   </a:solidFill>
@@ -6749,7 +6803,7 @@
                 <a:t>]: {</a:t>
               </a:r>
               <a:r>
-                <a:rPr lang="en" altLang="zh-CN" sz="900" dirty="0">
+                <a:rPr lang="en" altLang="zh-CN" sz="700" dirty="0">
                   <a:solidFill>
                     <a:schemeClr val="tx1"/>
                   </a:solidFill>
@@ -6760,7 +6814,7 @@
               </a:r>
             </a:p>
             <a:p>
-              <a:endParaRPr lang="en" altLang="zh-CN" sz="900" dirty="0">
+              <a:endParaRPr lang="en" altLang="zh-CN" sz="700" dirty="0">
                 <a:solidFill>
                   <a:schemeClr val="tx1"/>
                 </a:solidFill>
@@ -6770,7 +6824,7 @@
             </a:p>
             <a:p>
               <a:r>
-                <a:rPr lang="zh-CN" altLang="en-US" sz="900" dirty="0">
+                <a:rPr lang="zh-CN" altLang="en-US" sz="700" dirty="0">
                   <a:solidFill>
                     <a:schemeClr val="tx1"/>
                   </a:solidFill>
@@ -6780,7 +6834,7 @@
                 <a:t>请在</a:t>
               </a:r>
               <a:r>
-                <a:rPr lang="en-US" altLang="zh-CN" sz="900" dirty="0">
+                <a:rPr lang="en-US" altLang="zh-CN" sz="700" dirty="0">
                   <a:solidFill>
                     <a:schemeClr val="tx1"/>
                   </a:solidFill>
@@ -6790,7 +6844,7 @@
                 <a:t>"## </a:t>
               </a:r>
               <a:r>
-                <a:rPr lang="en" altLang="zh-CN" sz="900" dirty="0">
+                <a:rPr lang="en" altLang="zh-CN" sz="700" dirty="0">
                   <a:solidFill>
                     <a:schemeClr val="tx1"/>
                   </a:solidFill>
@@ -6800,7 +6854,7 @@
                 <a:t>Analysis:"</a:t>
               </a:r>
               <a:r>
-                <a:rPr lang="zh-CN" altLang="en-US" sz="900" dirty="0">
+                <a:rPr lang="zh-CN" altLang="en-US" sz="700" dirty="0">
                   <a:solidFill>
                     <a:schemeClr val="tx1"/>
                   </a:solidFill>
@@ -6810,7 +6864,7 @@
                 <a:t>后生成你对</a:t>
               </a:r>
               <a:r>
-                <a:rPr lang="zh-CN" altLang="en-US" sz="900" dirty="0">
+                <a:rPr lang="zh-CN" altLang="en-US" sz="700" dirty="0">
                   <a:solidFill>
                     <a:schemeClr val="tx1"/>
                   </a:solidFill>
@@ -6823,7 +6877,7 @@
                 <a:t>问题的分析</a:t>
               </a:r>
               <a:r>
-                <a:rPr lang="zh-CN" altLang="en-US" sz="900" dirty="0">
+                <a:rPr lang="zh-CN" altLang="en-US" sz="700" dirty="0">
                   <a:solidFill>
                     <a:schemeClr val="tx1"/>
                   </a:solidFill>
@@ -6833,7 +6887,7 @@
                 <a:t>，以及</a:t>
               </a:r>
               <a:r>
-                <a:rPr lang="zh-CN" altLang="en-US" sz="900" dirty="0">
+                <a:rPr lang="zh-CN" altLang="en-US" sz="700" dirty="0">
                   <a:solidFill>
                     <a:schemeClr val="tx1"/>
                   </a:solidFill>
@@ -6846,7 +6900,7 @@
                 <a:t>推理过程</a:t>
               </a:r>
               <a:r>
-                <a:rPr lang="zh-CN" altLang="en-US" sz="900" dirty="0">
+                <a:rPr lang="zh-CN" altLang="en-US" sz="700" dirty="0">
                   <a:solidFill>
                     <a:schemeClr val="tx1"/>
                   </a:solidFill>
@@ -6856,7 +6910,7 @@
                 <a:t>，</a:t>
               </a:r>
               <a:r>
-                <a:rPr lang="en-US" altLang="zh-CN" sz="900" dirty="0">
+                <a:rPr lang="en-US" altLang="zh-CN" sz="700" dirty="0">
                   <a:solidFill>
                     <a:schemeClr val="tx1"/>
                   </a:solidFill>
@@ -6866,7 +6920,7 @@
                 <a:t>"## </a:t>
               </a:r>
               <a:r>
-                <a:rPr lang="en" altLang="zh-CN" sz="900" dirty="0">
+                <a:rPr lang="en" altLang="zh-CN" sz="700" dirty="0">
                   <a:solidFill>
                     <a:schemeClr val="tx1"/>
                   </a:solidFill>
@@ -6876,7 +6930,7 @@
                 <a:t>Output:"</a:t>
               </a:r>
               <a:r>
-                <a:rPr lang="zh-CN" altLang="en-US" sz="900" dirty="0">
+                <a:rPr lang="zh-CN" altLang="en-US" sz="700" dirty="0">
                   <a:solidFill>
                     <a:schemeClr val="tx1"/>
                   </a:solidFill>
@@ -6886,7 +6940,7 @@
                 <a:t>后生成</a:t>
               </a:r>
               <a:r>
-                <a:rPr lang="zh-CN" altLang="en-US" sz="900" b="1" dirty="0">
+                <a:rPr lang="zh-CN" altLang="en-US" sz="700" b="1" dirty="0">
                   <a:solidFill>
                     <a:srgbClr val="FF0000"/>
                   </a:solidFill>
@@ -6896,7 +6950,7 @@
                 <a:t>舆情文本</a:t>
               </a:r>
               <a:r>
-                <a:rPr lang="zh-CN" altLang="en-US" sz="900" dirty="0">
+                <a:rPr lang="zh-CN" altLang="en-US" sz="700" dirty="0">
                   <a:solidFill>
                     <a:schemeClr val="tx1"/>
                   </a:solidFill>
@@ -6906,7 +6960,7 @@
                 <a:t>和</a:t>
               </a:r>
               <a:r>
-                <a:rPr lang="zh-CN" altLang="en-US" sz="900" b="1" dirty="0">
+                <a:rPr lang="zh-CN" altLang="en-US" sz="700" b="1" dirty="0">
                   <a:solidFill>
                     <a:srgbClr val="FF0000"/>
                   </a:solidFill>
@@ -6916,7 +6970,7 @@
                 <a:t>风险详情描述</a:t>
               </a:r>
               <a:r>
-                <a:rPr lang="zh-CN" altLang="en-US" sz="900" dirty="0">
+                <a:rPr lang="zh-CN" altLang="en-US" sz="700" dirty="0">
                   <a:solidFill>
                     <a:schemeClr val="tx1"/>
                   </a:solidFill>
@@ -6928,7 +6982,7 @@
             </a:p>
             <a:p>
               <a:r>
-                <a:rPr lang="en-US" altLang="zh-CN" sz="900" dirty="0">
+                <a:rPr lang="en-US" altLang="zh-CN" sz="700" dirty="0">
                   <a:solidFill>
                     <a:schemeClr val="tx1"/>
                   </a:solidFill>
@@ -6938,7 +6992,7 @@
                 <a:t>## </a:t>
               </a:r>
               <a:r>
-                <a:rPr lang="en" altLang="zh-CN" sz="900" dirty="0">
+                <a:rPr lang="en" altLang="zh-CN" sz="700" dirty="0">
                   <a:solidFill>
                     <a:schemeClr val="tx1"/>
                   </a:solidFill>
@@ -6950,7 +7004,7 @@
             </a:p>
             <a:p>
               <a:r>
-                <a:rPr lang="en" altLang="zh-CN" sz="900" dirty="0">
+                <a:rPr lang="en" altLang="zh-CN" sz="700" dirty="0">
                   <a:solidFill>
                     <a:schemeClr val="tx1"/>
                   </a:solidFill>
@@ -6962,7 +7016,7 @@
             </a:p>
             <a:p>
               <a:r>
-                <a:rPr lang="en" altLang="zh-CN" sz="900" dirty="0">
+                <a:rPr lang="en" altLang="zh-CN" sz="700" dirty="0">
                   <a:solidFill>
                     <a:schemeClr val="tx1"/>
                   </a:solidFill>
@@ -6972,7 +7026,7 @@
                 <a:t>[</a:t>
               </a:r>
               <a:r>
-                <a:rPr lang="zh-CN" altLang="en-US" sz="900" dirty="0">
+                <a:rPr lang="zh-CN" altLang="en-US" sz="700" dirty="0">
                   <a:solidFill>
                     <a:schemeClr val="tx1"/>
                   </a:solidFill>
@@ -6982,7 +7036,7 @@
                 <a:t>舆情文本</a:t>
               </a:r>
               <a:r>
-                <a:rPr lang="en-US" altLang="zh-CN" sz="900" dirty="0">
+                <a:rPr lang="en-US" altLang="zh-CN" sz="700" dirty="0">
                   <a:solidFill>
                     <a:schemeClr val="tx1"/>
                   </a:solidFill>
@@ -6992,7 +7046,7 @@
                 <a:t>]: </a:t>
               </a:r>
               <a:r>
-                <a:rPr lang="en" altLang="zh-CN" sz="900" dirty="0">
+                <a:rPr lang="en" altLang="zh-CN" sz="700" dirty="0">
                   <a:solidFill>
                     <a:schemeClr val="tx1"/>
                   </a:solidFill>
@@ -7004,7 +7058,7 @@
             </a:p>
             <a:p>
               <a:r>
-                <a:rPr lang="en" altLang="zh-CN" sz="900" dirty="0">
+                <a:rPr lang="en" altLang="zh-CN" sz="700" dirty="0">
                   <a:solidFill>
                     <a:schemeClr val="tx1"/>
                   </a:solidFill>
@@ -7014,7 +7068,7 @@
                 <a:t>[</a:t>
               </a:r>
               <a:r>
-                <a:rPr lang="zh-CN" altLang="en-US" sz="900" dirty="0">
+                <a:rPr lang="zh-CN" altLang="en-US" sz="700" dirty="0">
                   <a:solidFill>
                     <a:schemeClr val="tx1"/>
                   </a:solidFill>
@@ -7024,7 +7078,7 @@
                 <a:t>风险详请描述</a:t>
               </a:r>
               <a:r>
-                <a:rPr lang="en-US" altLang="zh-CN" sz="900" dirty="0">
+                <a:rPr lang="en-US" altLang="zh-CN" sz="700" dirty="0">
                   <a:solidFill>
                     <a:schemeClr val="tx1"/>
                   </a:solidFill>
@@ -7034,7 +7088,7 @@
                 <a:t>]: </a:t>
               </a:r>
               <a:r>
-                <a:rPr lang="en" altLang="zh-CN" sz="900" dirty="0">
+                <a:rPr lang="en" altLang="zh-CN" sz="700" dirty="0">
                   <a:solidFill>
                     <a:schemeClr val="tx1"/>
                   </a:solidFill>
@@ -7043,7 +7097,7 @@
                 </a:rPr>
                 <a:t>xxx</a:t>
               </a:r>
-              <a:endParaRPr lang="zh-CN" altLang="en-US" sz="900" b="1" dirty="0">
+              <a:endParaRPr lang="zh-CN" altLang="en-US" sz="700" b="1" dirty="0">
                 <a:solidFill>
                   <a:srgbClr val="0070C0"/>
                 </a:solidFill>
@@ -7094,36 +7148,6 @@
           </p:txBody>
         </p:sp>
       </p:grpSp>
-      <p:pic>
-        <p:nvPicPr>
-          <p:cNvPr id="9" name="图片 8">
-            <a:extLst>
-              <a:ext uri="{FF2B5EF4-FFF2-40B4-BE49-F238E27FC236}">
-                <a16:creationId xmlns:a16="http://schemas.microsoft.com/office/drawing/2014/main" id="{B22C734D-FC3A-4F16-8EDF-121CF5FF0F5F}"/>
-              </a:ext>
-            </a:extLst>
-          </p:cNvPr>
-          <p:cNvPicPr>
-            <a:picLocks noChangeAspect="1"/>
-          </p:cNvPicPr>
-          <p:nvPr/>
-        </p:nvPicPr>
-        <p:blipFill>
-          <a:blip r:embed="rId15"/>
-          <a:stretch>
-            <a:fillRect/>
-          </a:stretch>
-        </p:blipFill>
-        <p:spPr>
-          <a:xfrm>
-            <a:off x="1148719" y="2084790"/>
-            <a:ext cx="2169043" cy="1357708"/>
-          </a:xfrm>
-          <a:prstGeom prst="rect">
-            <a:avLst/>
-          </a:prstGeom>
-        </p:spPr>
-      </p:pic>
       <p:sp>
         <p:nvSpPr>
           <p:cNvPr id="11" name="文本框 10">
@@ -7138,7 +7162,7 @@
         </p:nvSpPr>
         <p:spPr>
           <a:xfrm>
-            <a:off x="1252566" y="1673040"/>
+            <a:off x="1322971" y="1683460"/>
             <a:ext cx="2005012" cy="338554"/>
           </a:xfrm>
           <a:prstGeom prst="rect">
@@ -7417,7 +7441,7 @@
         </p:nvSpPr>
         <p:spPr>
           <a:xfrm>
-            <a:off x="8815633" y="3282449"/>
+            <a:off x="8161268" y="3295947"/>
             <a:ext cx="1214377" cy="276999"/>
           </a:xfrm>
           <a:prstGeom prst="rightArrow">
@@ -7478,10 +7502,10 @@
         </p:nvGrpSpPr>
         <p:grpSpPr>
           <a:xfrm>
-            <a:off x="10032022" y="2836860"/>
-            <a:ext cx="1972945" cy="1468753"/>
-            <a:chOff x="5509100" y="1316926"/>
-            <a:chExt cx="1973234" cy="1468617"/>
+            <a:off x="9377657" y="3285789"/>
+            <a:ext cx="1972945" cy="1033323"/>
+            <a:chOff x="5509100" y="1752316"/>
+            <a:chExt cx="1973234" cy="1033227"/>
           </a:xfrm>
         </p:grpSpPr>
         <p:pic>
@@ -7499,7 +7523,7 @@
             <p:nvPr/>
           </p:nvPicPr>
           <p:blipFill>
-            <a:blip r:embed="rId16"/>
+            <a:blip r:embed="rId15"/>
             <a:stretch>
               <a:fillRect/>
             </a:stretch>
@@ -7529,7 +7553,7 @@
             <p:nvPr/>
           </p:nvPicPr>
           <p:blipFill>
-            <a:blip r:embed="rId17"/>
+            <a:blip r:embed="rId16"/>
             <a:stretch>
               <a:fillRect/>
             </a:stretch>
@@ -7538,36 +7562,6 @@
             <a:xfrm>
               <a:off x="5608513" y="2284098"/>
               <a:ext cx="1873821" cy="501445"/>
-            </a:xfrm>
-            <a:prstGeom prst="rect">
-              <a:avLst/>
-            </a:prstGeom>
-          </p:spPr>
-        </p:pic>
-        <p:pic>
-          <p:nvPicPr>
-            <p:cNvPr id="35" name="图片 34">
-              <a:extLst>
-                <a:ext uri="{FF2B5EF4-FFF2-40B4-BE49-F238E27FC236}">
-                  <a16:creationId xmlns:a16="http://schemas.microsoft.com/office/drawing/2014/main" id="{59CFBC4C-49F8-4A66-B4B8-BCC95952237E}"/>
-                </a:ext>
-              </a:extLst>
-            </p:cNvPr>
-            <p:cNvPicPr>
-              <a:picLocks noChangeAspect="1"/>
-            </p:cNvPicPr>
-            <p:nvPr/>
-          </p:nvPicPr>
-          <p:blipFill>
-            <a:blip r:embed="rId18"/>
-            <a:stretch>
-              <a:fillRect/>
-            </a:stretch>
-          </p:blipFill>
-          <p:spPr>
-            <a:xfrm>
-              <a:off x="5651561" y="1316926"/>
-              <a:ext cx="1612083" cy="447802"/>
             </a:xfrm>
             <a:prstGeom prst="rect">
               <a:avLst/>
@@ -7589,7 +7583,7 @@
         </p:nvSpPr>
         <p:spPr>
           <a:xfrm>
-            <a:off x="10070757" y="2442527"/>
+            <a:off x="9416392" y="2456025"/>
             <a:ext cx="1995170" cy="1972945"/>
           </a:xfrm>
           <a:prstGeom prst="roundRect">
@@ -7741,7 +7735,7 @@
         </p:nvSpPr>
         <p:spPr>
           <a:xfrm>
-            <a:off x="10708297" y="2459037"/>
+            <a:off x="10053932" y="2472535"/>
             <a:ext cx="746760" cy="398780"/>
           </a:xfrm>
           <a:prstGeom prst="rect">
@@ -7884,7 +7878,7 @@
         </p:nvSpPr>
         <p:spPr>
           <a:xfrm>
-            <a:off x="1310927" y="3465720"/>
+            <a:off x="1340405" y="3014905"/>
             <a:ext cx="1899128" cy="369332"/>
           </a:xfrm>
           <a:prstGeom prst="rect">
@@ -7923,14 +7917,14 @@
           <p:nvPr/>
         </p:nvPicPr>
         <p:blipFill>
-          <a:blip r:embed="rId19"/>
+          <a:blip r:embed="rId17"/>
           <a:stretch>
             <a:fillRect/>
           </a:stretch>
         </p:blipFill>
         <p:spPr>
           <a:xfrm>
-            <a:off x="1021865" y="3818986"/>
+            <a:off x="969122" y="3366323"/>
             <a:ext cx="2550407" cy="1230347"/>
           </a:xfrm>
           <a:prstGeom prst="rect">
@@ -7990,7 +7984,7 @@
         </p:nvSpPr>
         <p:spPr>
           <a:xfrm>
-            <a:off x="8712562" y="3001479"/>
+            <a:off x="8058197" y="3014977"/>
             <a:ext cx="1459054" cy="276999"/>
           </a:xfrm>
           <a:prstGeom prst="rect">
@@ -8054,7 +8048,7 @@
         </p:nvSpPr>
         <p:spPr>
           <a:xfrm>
-            <a:off x="8985052" y="3527123"/>
+            <a:off x="8330687" y="3540621"/>
             <a:ext cx="906294" cy="276999"/>
           </a:xfrm>
           <a:prstGeom prst="rect">
@@ -8069,14 +8063,978 @@
           <a:lstStyle/>
           <a:p>
             <a:r>
-              <a:rPr kumimoji="1" lang="en-US" altLang="zh-CN" sz="1200" dirty="0">
+              <a:rPr kumimoji="1" lang="en-US" altLang="zh-CN" sz="1200" b="1" dirty="0">
                 <a:latin typeface="Comic Sans MS" panose="030F0902030302020204" pitchFamily="66" charset="0"/>
               </a:rPr>
               <a:t>Few-Shot</a:t>
             </a:r>
-            <a:endParaRPr kumimoji="1" lang="zh-CN" altLang="en-US" sz="1200" dirty="0">
+            <a:endParaRPr kumimoji="1" lang="zh-CN" altLang="en-US" sz="1200" b="1" dirty="0">
               <a:latin typeface="Comic Sans MS" panose="030F0902030302020204" pitchFamily="66" charset="0"/>
             </a:endParaRPr>
+          </a:p>
+        </p:txBody>
+      </p:sp>
+      <p:pic>
+        <p:nvPicPr>
+          <p:cNvPr id="1026" name="Picture 2" descr="GitHub - QwenLM/Qwen2: Qwen2 is the large language model ...">
+            <a:extLst>
+              <a:ext uri="{FF2B5EF4-FFF2-40B4-BE49-F238E27FC236}">
+                <a16:creationId xmlns:a16="http://schemas.microsoft.com/office/drawing/2014/main" id="{3DB90EAC-3A22-2799-7F26-833C3654EA09}"/>
+              </a:ext>
+            </a:extLst>
+          </p:cNvPr>
+          <p:cNvPicPr>
+            <a:picLocks noChangeAspect="1" noChangeArrowheads="1"/>
+          </p:cNvPicPr>
+          <p:nvPr/>
+        </p:nvPicPr>
+        <p:blipFill>
+          <a:blip r:embed="rId18">
+            <a:extLst>
+              <a:ext uri="{28A0092B-C50C-407E-A947-70E740481C1C}">
+                <a14:useLocalDpi xmlns:a14="http://schemas.microsoft.com/office/drawing/2010/main" val="0"/>
+              </a:ext>
+            </a:extLst>
+          </a:blip>
+          <a:srcRect/>
+          <a:stretch>
+            <a:fillRect/>
+          </a:stretch>
+        </p:blipFill>
+        <p:spPr bwMode="auto">
+          <a:xfrm>
+            <a:off x="9555986" y="2849375"/>
+            <a:ext cx="1459054" cy="426507"/>
+          </a:xfrm>
+          <a:prstGeom prst="rect">
+            <a:avLst/>
+          </a:prstGeom>
+          <a:noFill/>
+          <a:extLst>
+            <a:ext uri="{909E8E84-426E-40DD-AFC4-6F175D3DCCD1}">
+              <a14:hiddenFill xmlns:a14="http://schemas.microsoft.com/office/drawing/2010/main">
+                <a:solidFill>
+                  <a:srgbClr val="FFFFFF"/>
+                </a:solidFill>
+              </a14:hiddenFill>
+            </a:ext>
+          </a:extLst>
+        </p:spPr>
+      </p:pic>
+      <p:pic>
+        <p:nvPicPr>
+          <p:cNvPr id="17" name="图片 16">
+            <a:extLst>
+              <a:ext uri="{FF2B5EF4-FFF2-40B4-BE49-F238E27FC236}">
+                <a16:creationId xmlns:a16="http://schemas.microsoft.com/office/drawing/2014/main" id="{A25A7605-4190-C341-187A-8778A2A61A82}"/>
+              </a:ext>
+            </a:extLst>
+          </p:cNvPr>
+          <p:cNvPicPr>
+            <a:picLocks noChangeAspect="1"/>
+          </p:cNvPicPr>
+          <p:nvPr/>
+        </p:nvPicPr>
+        <p:blipFill>
+          <a:blip r:embed="rId19"/>
+          <a:stretch>
+            <a:fillRect/>
+          </a:stretch>
+        </p:blipFill>
+        <p:spPr>
+          <a:xfrm>
+            <a:off x="1290773" y="2007217"/>
+            <a:ext cx="1821998" cy="1048508"/>
+          </a:xfrm>
+          <a:prstGeom prst="rect">
+            <a:avLst/>
+          </a:prstGeom>
+        </p:spPr>
+      </p:pic>
+      <p:sp>
+        <p:nvSpPr>
+          <p:cNvPr id="29" name="箭头: 右 27">
+            <a:extLst>
+              <a:ext uri="{FF2B5EF4-FFF2-40B4-BE49-F238E27FC236}">
+                <a16:creationId xmlns:a16="http://schemas.microsoft.com/office/drawing/2014/main" id="{9BE40C8C-7D02-A37D-DD26-FA6288642E54}"/>
+              </a:ext>
+            </a:extLst>
+          </p:cNvPr>
+          <p:cNvSpPr/>
+          <p:nvPr/>
+        </p:nvSpPr>
+        <p:spPr>
+          <a:xfrm rot="5400000">
+            <a:off x="10049895" y="4687966"/>
+            <a:ext cx="730895" cy="421229"/>
+          </a:xfrm>
+          <a:prstGeom prst="rightArrow">
+            <a:avLst/>
+          </a:prstGeom>
+          <a:solidFill>
+            <a:schemeClr val="accent4">
+              <a:lumMod val="60000"/>
+              <a:lumOff val="40000"/>
+            </a:schemeClr>
+          </a:solidFill>
+          <a:ln>
+            <a:solidFill>
+              <a:schemeClr val="accent1">
+                <a:lumMod val="60000"/>
+                <a:lumOff val="40000"/>
+              </a:schemeClr>
+            </a:solidFill>
+            <a:prstDash val="sysDash"/>
+          </a:ln>
+        </p:spPr>
+        <p:style>
+          <a:lnRef idx="2">
+            <a:schemeClr val="accent1">
+              <a:shade val="50000"/>
+            </a:schemeClr>
+          </a:lnRef>
+          <a:fillRef idx="1">
+            <a:schemeClr val="accent1"/>
+          </a:fillRef>
+          <a:effectRef idx="0">
+            <a:schemeClr val="accent1"/>
+          </a:effectRef>
+          <a:fontRef idx="minor">
+            <a:schemeClr val="lt1"/>
+          </a:fontRef>
+        </p:style>
+        <p:txBody>
+          <a:bodyPr rtlCol="0" anchor="ctr"/>
+          <a:lstStyle/>
+          <a:p>
+            <a:pPr algn="ctr"/>
+            <a:endParaRPr lang="zh-CN" altLang="en-US"/>
+          </a:p>
+        </p:txBody>
+      </p:sp>
+      <p:pic>
+        <p:nvPicPr>
+          <p:cNvPr id="37" name="图片 36">
+            <a:extLst>
+              <a:ext uri="{FF2B5EF4-FFF2-40B4-BE49-F238E27FC236}">
+                <a16:creationId xmlns:a16="http://schemas.microsoft.com/office/drawing/2014/main" id="{4CD1962A-4BB9-F02A-1F67-8839381FEB0B}"/>
+              </a:ext>
+            </a:extLst>
+          </p:cNvPr>
+          <p:cNvPicPr>
+            <a:picLocks noChangeAspect="1"/>
+          </p:cNvPicPr>
+          <p:nvPr/>
+        </p:nvPicPr>
+        <p:blipFill>
+          <a:blip r:embed="rId20"/>
+          <a:stretch>
+            <a:fillRect/>
+          </a:stretch>
+        </p:blipFill>
+        <p:spPr>
+          <a:xfrm>
+            <a:off x="9236981" y="5417084"/>
+            <a:ext cx="2226261" cy="1090718"/>
+          </a:xfrm>
+          <a:prstGeom prst="rect">
+            <a:avLst/>
+          </a:prstGeom>
+        </p:spPr>
+      </p:pic>
+      <p:sp>
+        <p:nvSpPr>
+          <p:cNvPr id="38" name="箭头: 右 27">
+            <a:extLst>
+              <a:ext uri="{FF2B5EF4-FFF2-40B4-BE49-F238E27FC236}">
+                <a16:creationId xmlns:a16="http://schemas.microsoft.com/office/drawing/2014/main" id="{C13E320E-ACAA-824B-DDEE-AAA3DBC0EB1A}"/>
+              </a:ext>
+            </a:extLst>
+          </p:cNvPr>
+          <p:cNvSpPr/>
+          <p:nvPr/>
+        </p:nvSpPr>
+        <p:spPr>
+          <a:xfrm rot="10800000">
+            <a:off x="8382432" y="5803578"/>
+            <a:ext cx="802803" cy="339692"/>
+          </a:xfrm>
+          <a:prstGeom prst="rightArrow">
+            <a:avLst/>
+          </a:prstGeom>
+          <a:solidFill>
+            <a:schemeClr val="accent4">
+              <a:lumMod val="60000"/>
+              <a:lumOff val="40000"/>
+            </a:schemeClr>
+          </a:solidFill>
+          <a:ln>
+            <a:solidFill>
+              <a:schemeClr val="accent1">
+                <a:lumMod val="60000"/>
+                <a:lumOff val="40000"/>
+              </a:schemeClr>
+            </a:solidFill>
+            <a:prstDash val="sysDash"/>
+          </a:ln>
+        </p:spPr>
+        <p:style>
+          <a:lnRef idx="2">
+            <a:schemeClr val="accent1">
+              <a:shade val="50000"/>
+            </a:schemeClr>
+          </a:lnRef>
+          <a:fillRef idx="1">
+            <a:schemeClr val="accent1"/>
+          </a:fillRef>
+          <a:effectRef idx="0">
+            <a:schemeClr val="accent1"/>
+          </a:effectRef>
+          <a:fontRef idx="minor">
+            <a:schemeClr val="lt1"/>
+          </a:fontRef>
+        </p:style>
+        <p:txBody>
+          <a:bodyPr rtlCol="0" anchor="ctr"/>
+          <a:lstStyle/>
+          <a:p>
+            <a:pPr algn="ctr"/>
+            <a:endParaRPr lang="zh-CN" altLang="en-US"/>
+          </a:p>
+        </p:txBody>
+      </p:sp>
+      <p:pic>
+        <p:nvPicPr>
+          <p:cNvPr id="1032" name="Picture 8" descr="Total Score">
+            <a:extLst>
+              <a:ext uri="{FF2B5EF4-FFF2-40B4-BE49-F238E27FC236}">
+                <a16:creationId xmlns:a16="http://schemas.microsoft.com/office/drawing/2014/main" id="{B747C198-8260-517A-0E20-3B2B93BA0687}"/>
+              </a:ext>
+            </a:extLst>
+          </p:cNvPr>
+          <p:cNvPicPr>
+            <a:picLocks noChangeAspect="1" noChangeArrowheads="1"/>
+          </p:cNvPicPr>
+          <p:nvPr/>
+        </p:nvPicPr>
+        <p:blipFill>
+          <a:blip r:embed="rId21">
+            <a:extLst>
+              <a:ext uri="{28A0092B-C50C-407E-A947-70E740481C1C}">
+                <a14:useLocalDpi xmlns:a14="http://schemas.microsoft.com/office/drawing/2010/main" val="0"/>
+              </a:ext>
+            </a:extLst>
+          </a:blip>
+          <a:srcRect/>
+          <a:stretch>
+            <a:fillRect/>
+          </a:stretch>
+        </p:blipFill>
+        <p:spPr bwMode="auto">
+          <a:xfrm>
+            <a:off x="7548720" y="5614267"/>
+            <a:ext cx="701901" cy="701901"/>
+          </a:xfrm>
+          <a:prstGeom prst="rect">
+            <a:avLst/>
+          </a:prstGeom>
+          <a:noFill/>
+          <a:extLst>
+            <a:ext uri="{909E8E84-426E-40DD-AFC4-6F175D3DCCD1}">
+              <a14:hiddenFill xmlns:a14="http://schemas.microsoft.com/office/drawing/2010/main">
+                <a:solidFill>
+                  <a:srgbClr val="FFFFFF"/>
+                </a:solidFill>
+              </a14:hiddenFill>
+            </a:ext>
+          </a:extLst>
+        </p:spPr>
+      </p:pic>
+      <p:sp>
+        <p:nvSpPr>
+          <p:cNvPr id="43" name="文本框 42">
+            <a:extLst>
+              <a:ext uri="{FF2B5EF4-FFF2-40B4-BE49-F238E27FC236}">
+                <a16:creationId xmlns:a16="http://schemas.microsoft.com/office/drawing/2014/main" id="{697DCFD4-CB51-7E33-D2C9-579814015E9D}"/>
+              </a:ext>
+            </a:extLst>
+          </p:cNvPr>
+          <p:cNvSpPr txBox="1"/>
+          <p:nvPr/>
+        </p:nvSpPr>
+        <p:spPr>
+          <a:xfrm>
+            <a:off x="8415783" y="5576482"/>
+            <a:ext cx="736099" cy="253916"/>
+          </a:xfrm>
+          <a:prstGeom prst="rect">
+            <a:avLst/>
+          </a:prstGeom>
+          <a:noFill/>
+        </p:spPr>
+        <p:txBody>
+          <a:bodyPr wrap="none" rtlCol="0">
+            <a:spAutoFit/>
+          </a:bodyPr>
+          <a:lstStyle/>
+          <a:p>
+            <a:r>
+              <a:rPr lang="zh-CN" altLang="en-US" sz="1050" b="1" dirty="0">
+                <a:latin typeface="KaiTi" panose="02010609060101010101" pitchFamily="49" charset="-122"/>
+                <a:ea typeface="KaiTi" panose="02010609060101010101" pitchFamily="49" charset="-122"/>
+              </a:rPr>
+              <a:t>指令微调</a:t>
+            </a:r>
+          </a:p>
+        </p:txBody>
+      </p:sp>
+      <p:sp>
+        <p:nvSpPr>
+          <p:cNvPr id="44" name="圆角矩形标注 43">
+            <a:extLst>
+              <a:ext uri="{FF2B5EF4-FFF2-40B4-BE49-F238E27FC236}">
+                <a16:creationId xmlns:a16="http://schemas.microsoft.com/office/drawing/2014/main" id="{E2C771BB-AE47-182C-FACA-3A2A0AE8DB0E}"/>
+              </a:ext>
+            </a:extLst>
+          </p:cNvPr>
+          <p:cNvSpPr/>
+          <p:nvPr/>
+        </p:nvSpPr>
+        <p:spPr>
+          <a:xfrm>
+            <a:off x="5129048" y="5604965"/>
+            <a:ext cx="1793571" cy="627669"/>
+          </a:xfrm>
+          <a:prstGeom prst="wedgeRoundRectCallout">
+            <a:avLst>
+              <a:gd name="adj1" fmla="val 91288"/>
+              <a:gd name="adj2" fmla="val 2071"/>
+              <a:gd name="adj3" fmla="val 16667"/>
+            </a:avLst>
+          </a:prstGeom>
+          <a:solidFill>
+            <a:schemeClr val="accent1">
+              <a:lumMod val="40000"/>
+              <a:lumOff val="60000"/>
+            </a:schemeClr>
+          </a:solidFill>
+          <a:ln>
+            <a:solidFill>
+              <a:srgbClr val="FF0000"/>
+            </a:solidFill>
+            <a:prstDash val="sysDash"/>
+            <a:extLst>
+              <a:ext uri="{C807C97D-BFC1-408E-A445-0C87EB9F89A2}">
+                <ask:lineSketchStyleProps xmlns:ask="http://schemas.microsoft.com/office/drawing/2018/sketchyshapes" sd="1219033472">
+                  <a:custGeom>
+                    <a:avLst/>
+                    <a:gdLst>
+                      <a:gd name="connsiteX0" fmla="*/ 0 w 1793571"/>
+                      <a:gd name="connsiteY0" fmla="*/ 104614 h 627669"/>
+                      <a:gd name="connsiteX1" fmla="*/ 104614 w 1793571"/>
+                      <a:gd name="connsiteY1" fmla="*/ 0 h 627669"/>
+                      <a:gd name="connsiteX2" fmla="*/ 1046250 w 1793571"/>
+                      <a:gd name="connsiteY2" fmla="*/ 0 h 627669"/>
+                      <a:gd name="connsiteX3" fmla="*/ 1046250 w 1793571"/>
+                      <a:gd name="connsiteY3" fmla="*/ 0 h 627669"/>
+                      <a:gd name="connsiteX4" fmla="*/ 1494643 w 1793571"/>
+                      <a:gd name="connsiteY4" fmla="*/ 0 h 627669"/>
+                      <a:gd name="connsiteX5" fmla="*/ 1688957 w 1793571"/>
+                      <a:gd name="connsiteY5" fmla="*/ 0 h 627669"/>
+                      <a:gd name="connsiteX6" fmla="*/ 1793571 w 1793571"/>
+                      <a:gd name="connsiteY6" fmla="*/ 104614 h 627669"/>
+                      <a:gd name="connsiteX7" fmla="*/ 1793571 w 1793571"/>
+                      <a:gd name="connsiteY7" fmla="*/ 366140 h 627669"/>
+                      <a:gd name="connsiteX8" fmla="*/ 2534101 w 1793571"/>
+                      <a:gd name="connsiteY8" fmla="*/ 326834 h 627669"/>
+                      <a:gd name="connsiteX9" fmla="*/ 1793571 w 1793571"/>
+                      <a:gd name="connsiteY9" fmla="*/ 523058 h 627669"/>
+                      <a:gd name="connsiteX10" fmla="*/ 1793571 w 1793571"/>
+                      <a:gd name="connsiteY10" fmla="*/ 523055 h 627669"/>
+                      <a:gd name="connsiteX11" fmla="*/ 1688957 w 1793571"/>
+                      <a:gd name="connsiteY11" fmla="*/ 627669 h 627669"/>
+                      <a:gd name="connsiteX12" fmla="*/ 1494643 w 1793571"/>
+                      <a:gd name="connsiteY12" fmla="*/ 627669 h 627669"/>
+                      <a:gd name="connsiteX13" fmla="*/ 1046250 w 1793571"/>
+                      <a:gd name="connsiteY13" fmla="*/ 627669 h 627669"/>
+                      <a:gd name="connsiteX14" fmla="*/ 1046250 w 1793571"/>
+                      <a:gd name="connsiteY14" fmla="*/ 627669 h 627669"/>
+                      <a:gd name="connsiteX15" fmla="*/ 104614 w 1793571"/>
+                      <a:gd name="connsiteY15" fmla="*/ 627669 h 627669"/>
+                      <a:gd name="connsiteX16" fmla="*/ 0 w 1793571"/>
+                      <a:gd name="connsiteY16" fmla="*/ 523055 h 627669"/>
+                      <a:gd name="connsiteX17" fmla="*/ 0 w 1793571"/>
+                      <a:gd name="connsiteY17" fmla="*/ 523058 h 627669"/>
+                      <a:gd name="connsiteX18" fmla="*/ 0 w 1793571"/>
+                      <a:gd name="connsiteY18" fmla="*/ 366140 h 627669"/>
+                      <a:gd name="connsiteX19" fmla="*/ 0 w 1793571"/>
+                      <a:gd name="connsiteY19" fmla="*/ 366140 h 627669"/>
+                      <a:gd name="connsiteX20" fmla="*/ 0 w 1793571"/>
+                      <a:gd name="connsiteY20" fmla="*/ 104614 h 627669"/>
+                    </a:gdLst>
+                    <a:ahLst/>
+                    <a:cxnLst>
+                      <a:cxn ang="0">
+                        <a:pos x="connsiteX0" y="connsiteY0"/>
+                      </a:cxn>
+                      <a:cxn ang="0">
+                        <a:pos x="connsiteX1" y="connsiteY1"/>
+                      </a:cxn>
+                      <a:cxn ang="0">
+                        <a:pos x="connsiteX2" y="connsiteY2"/>
+                      </a:cxn>
+                      <a:cxn ang="0">
+                        <a:pos x="connsiteX3" y="connsiteY3"/>
+                      </a:cxn>
+                      <a:cxn ang="0">
+                        <a:pos x="connsiteX4" y="connsiteY4"/>
+                      </a:cxn>
+                      <a:cxn ang="0">
+                        <a:pos x="connsiteX5" y="connsiteY5"/>
+                      </a:cxn>
+                      <a:cxn ang="0">
+                        <a:pos x="connsiteX6" y="connsiteY6"/>
+                      </a:cxn>
+                      <a:cxn ang="0">
+                        <a:pos x="connsiteX7" y="connsiteY7"/>
+                      </a:cxn>
+                      <a:cxn ang="0">
+                        <a:pos x="connsiteX8" y="connsiteY8"/>
+                      </a:cxn>
+                      <a:cxn ang="0">
+                        <a:pos x="connsiteX9" y="connsiteY9"/>
+                      </a:cxn>
+                      <a:cxn ang="0">
+                        <a:pos x="connsiteX10" y="connsiteY10"/>
+                      </a:cxn>
+                      <a:cxn ang="0">
+                        <a:pos x="connsiteX11" y="connsiteY11"/>
+                      </a:cxn>
+                      <a:cxn ang="0">
+                        <a:pos x="connsiteX12" y="connsiteY12"/>
+                      </a:cxn>
+                      <a:cxn ang="0">
+                        <a:pos x="connsiteX13" y="connsiteY13"/>
+                      </a:cxn>
+                      <a:cxn ang="0">
+                        <a:pos x="connsiteX14" y="connsiteY14"/>
+                      </a:cxn>
+                      <a:cxn ang="0">
+                        <a:pos x="connsiteX15" y="connsiteY15"/>
+                      </a:cxn>
+                      <a:cxn ang="0">
+                        <a:pos x="connsiteX16" y="connsiteY16"/>
+                      </a:cxn>
+                      <a:cxn ang="0">
+                        <a:pos x="connsiteX17" y="connsiteY17"/>
+                      </a:cxn>
+                      <a:cxn ang="0">
+                        <a:pos x="connsiteX18" y="connsiteY18"/>
+                      </a:cxn>
+                      <a:cxn ang="0">
+                        <a:pos x="connsiteX19" y="connsiteY19"/>
+                      </a:cxn>
+                      <a:cxn ang="0">
+                        <a:pos x="connsiteX20" y="connsiteY20"/>
+                      </a:cxn>
+                    </a:cxnLst>
+                    <a:rect l="l" t="t" r="r" b="b"/>
+                    <a:pathLst>
+                      <a:path w="1793571" h="627669" fill="none" extrusionOk="0">
+                        <a:moveTo>
+                          <a:pt x="0" y="104614"/>
+                        </a:moveTo>
+                        <a:cubicBezTo>
+                          <a:pt x="-4079" y="54131"/>
+                          <a:pt x="54592" y="5763"/>
+                          <a:pt x="104614" y="0"/>
+                        </a:cubicBezTo>
+                        <a:cubicBezTo>
+                          <a:pt x="305641" y="-35402"/>
+                          <a:pt x="886668" y="82630"/>
+                          <a:pt x="1046250" y="0"/>
+                        </a:cubicBezTo>
+                        <a:lnTo>
+                          <a:pt x="1046250" y="0"/>
+                        </a:lnTo>
+                        <a:cubicBezTo>
+                          <a:pt x="1182739" y="-17741"/>
+                          <a:pt x="1352002" y="7551"/>
+                          <a:pt x="1494643" y="0"/>
+                        </a:cubicBezTo>
+                        <a:cubicBezTo>
+                          <a:pt x="1517095" y="9154"/>
+                          <a:pt x="1594153" y="-13961"/>
+                          <a:pt x="1688957" y="0"/>
+                        </a:cubicBezTo>
+                        <a:cubicBezTo>
+                          <a:pt x="1747827" y="-6248"/>
+                          <a:pt x="1791094" y="46697"/>
+                          <a:pt x="1793571" y="104614"/>
+                        </a:cubicBezTo>
+                        <a:cubicBezTo>
+                          <a:pt x="1797572" y="177366"/>
+                          <a:pt x="1812014" y="249384"/>
+                          <a:pt x="1793571" y="366140"/>
+                        </a:cubicBezTo>
+                        <a:cubicBezTo>
+                          <a:pt x="2148979" y="341145"/>
+                          <a:pt x="2305819" y="350607"/>
+                          <a:pt x="2534101" y="326834"/>
+                        </a:cubicBezTo>
+                        <a:cubicBezTo>
+                          <a:pt x="2360334" y="348327"/>
+                          <a:pt x="2092552" y="502336"/>
+                          <a:pt x="1793571" y="523058"/>
+                        </a:cubicBezTo>
+                        <a:lnTo>
+                          <a:pt x="1793571" y="523055"/>
+                        </a:lnTo>
+                        <a:cubicBezTo>
+                          <a:pt x="1802749" y="586614"/>
+                          <a:pt x="1746019" y="627826"/>
+                          <a:pt x="1688957" y="627669"/>
+                        </a:cubicBezTo>
+                        <a:cubicBezTo>
+                          <a:pt x="1633112" y="625058"/>
+                          <a:pt x="1572351" y="612442"/>
+                          <a:pt x="1494643" y="627669"/>
+                        </a:cubicBezTo>
+                        <a:cubicBezTo>
+                          <a:pt x="1312704" y="611302"/>
+                          <a:pt x="1199388" y="637270"/>
+                          <a:pt x="1046250" y="627669"/>
+                        </a:cubicBezTo>
+                        <a:lnTo>
+                          <a:pt x="1046250" y="627669"/>
+                        </a:lnTo>
+                        <a:cubicBezTo>
+                          <a:pt x="635436" y="666402"/>
+                          <a:pt x="316520" y="579269"/>
+                          <a:pt x="104614" y="627669"/>
+                        </a:cubicBezTo>
+                        <a:cubicBezTo>
+                          <a:pt x="37355" y="632986"/>
+                          <a:pt x="2103" y="586531"/>
+                          <a:pt x="0" y="523055"/>
+                        </a:cubicBezTo>
+                        <a:lnTo>
+                          <a:pt x="0" y="523058"/>
+                        </a:lnTo>
+                        <a:cubicBezTo>
+                          <a:pt x="-6155" y="479229"/>
+                          <a:pt x="-7850" y="383666"/>
+                          <a:pt x="0" y="366140"/>
+                        </a:cubicBezTo>
+                        <a:lnTo>
+                          <a:pt x="0" y="366140"/>
+                        </a:lnTo>
+                        <a:cubicBezTo>
+                          <a:pt x="19779" y="241096"/>
+                          <a:pt x="14498" y="198439"/>
+                          <a:pt x="0" y="104614"/>
+                        </a:cubicBezTo>
+                        <a:close/>
+                      </a:path>
+                      <a:path w="1793571" h="627669" stroke="0" extrusionOk="0">
+                        <a:moveTo>
+                          <a:pt x="0" y="104614"/>
+                        </a:moveTo>
+                        <a:cubicBezTo>
+                          <a:pt x="-4376" y="44138"/>
+                          <a:pt x="36097" y="4031"/>
+                          <a:pt x="104614" y="0"/>
+                        </a:cubicBezTo>
+                        <a:cubicBezTo>
+                          <a:pt x="352053" y="-70268"/>
+                          <a:pt x="621386" y="-2558"/>
+                          <a:pt x="1046250" y="0"/>
+                        </a:cubicBezTo>
+                        <a:lnTo>
+                          <a:pt x="1046250" y="0"/>
+                        </a:lnTo>
+                        <a:cubicBezTo>
+                          <a:pt x="1117720" y="-4139"/>
+                          <a:pt x="1338858" y="-336"/>
+                          <a:pt x="1494643" y="0"/>
+                        </a:cubicBezTo>
+                        <a:cubicBezTo>
+                          <a:pt x="1586773" y="4486"/>
+                          <a:pt x="1620338" y="10671"/>
+                          <a:pt x="1688957" y="0"/>
+                        </a:cubicBezTo>
+                        <a:cubicBezTo>
+                          <a:pt x="1757781" y="1311"/>
+                          <a:pt x="1798276" y="37155"/>
+                          <a:pt x="1793571" y="104614"/>
+                        </a:cubicBezTo>
+                        <a:cubicBezTo>
+                          <a:pt x="1815944" y="134972"/>
+                          <a:pt x="1789375" y="326586"/>
+                          <a:pt x="1793571" y="366140"/>
+                        </a:cubicBezTo>
+                        <a:cubicBezTo>
+                          <a:pt x="1942167" y="327933"/>
+                          <a:pt x="2383657" y="338326"/>
+                          <a:pt x="2534101" y="326834"/>
+                        </a:cubicBezTo>
+                        <a:cubicBezTo>
+                          <a:pt x="2252110" y="468190"/>
+                          <a:pt x="2122719" y="367623"/>
+                          <a:pt x="1793571" y="523058"/>
+                        </a:cubicBezTo>
+                        <a:lnTo>
+                          <a:pt x="1793571" y="523055"/>
+                        </a:lnTo>
+                        <a:cubicBezTo>
+                          <a:pt x="1783239" y="579161"/>
+                          <a:pt x="1748398" y="629030"/>
+                          <a:pt x="1688957" y="627669"/>
+                        </a:cubicBezTo>
+                        <a:cubicBezTo>
+                          <a:pt x="1617912" y="610823"/>
+                          <a:pt x="1582712" y="623630"/>
+                          <a:pt x="1494643" y="627669"/>
+                        </a:cubicBezTo>
+                        <a:cubicBezTo>
+                          <a:pt x="1410182" y="654911"/>
+                          <a:pt x="1159074" y="640271"/>
+                          <a:pt x="1046250" y="627669"/>
+                        </a:cubicBezTo>
+                        <a:lnTo>
+                          <a:pt x="1046250" y="627669"/>
+                        </a:lnTo>
+                        <a:cubicBezTo>
+                          <a:pt x="607886" y="637626"/>
+                          <a:pt x="453906" y="599417"/>
+                          <a:pt x="104614" y="627669"/>
+                        </a:cubicBezTo>
+                        <a:cubicBezTo>
+                          <a:pt x="44414" y="628067"/>
+                          <a:pt x="-9021" y="574607"/>
+                          <a:pt x="0" y="523055"/>
+                        </a:cubicBezTo>
+                        <a:lnTo>
+                          <a:pt x="0" y="523058"/>
+                        </a:lnTo>
+                        <a:cubicBezTo>
+                          <a:pt x="-6161" y="462979"/>
+                          <a:pt x="11085" y="430434"/>
+                          <a:pt x="0" y="366140"/>
+                        </a:cubicBezTo>
+                        <a:lnTo>
+                          <a:pt x="0" y="366140"/>
+                        </a:lnTo>
+                        <a:cubicBezTo>
+                          <a:pt x="5203" y="270889"/>
+                          <a:pt x="-16871" y="203026"/>
+                          <a:pt x="0" y="104614"/>
+                        </a:cubicBezTo>
+                        <a:close/>
+                      </a:path>
+                    </a:pathLst>
+                  </a:custGeom>
+                  <ask:type>
+                    <ask:lineSketchNone/>
+                  </ask:type>
+                </ask:lineSketchStyleProps>
+              </a:ext>
+            </a:extLst>
+          </a:ln>
+        </p:spPr>
+        <p:style>
+          <a:lnRef idx="2">
+            <a:schemeClr val="accent1">
+              <a:shade val="15000"/>
+            </a:schemeClr>
+          </a:lnRef>
+          <a:fillRef idx="1">
+            <a:schemeClr val="accent1"/>
+          </a:fillRef>
+          <a:effectRef idx="0">
+            <a:schemeClr val="accent1"/>
+          </a:effectRef>
+          <a:fontRef idx="minor">
+            <a:schemeClr val="lt1"/>
+          </a:fontRef>
+        </p:style>
+        <p:txBody>
+          <a:bodyPr rtlCol="0" anchor="ctr"/>
+          <a:lstStyle/>
+          <a:p>
+            <a:pPr algn="ctr"/>
+            <a:r>
+              <a:rPr kumimoji="1" lang="zh-CN" altLang="en-US" sz="1200" dirty="0">
+                <a:solidFill>
+                  <a:schemeClr val="tx1"/>
+                </a:solidFill>
+                <a:latin typeface="KaiTi" panose="02010609060101010101" pitchFamily="49" charset="-122"/>
+                <a:ea typeface="KaiTi" panose="02010609060101010101" pitchFamily="49" charset="-122"/>
+              </a:rPr>
+              <a:t>我能辅助标注</a:t>
+            </a:r>
+            <a:endParaRPr kumimoji="1" lang="en-US" altLang="zh-CN" sz="1200" dirty="0">
+              <a:solidFill>
+                <a:schemeClr val="tx1"/>
+              </a:solidFill>
+              <a:latin typeface="KaiTi" panose="02010609060101010101" pitchFamily="49" charset="-122"/>
+              <a:ea typeface="KaiTi" panose="02010609060101010101" pitchFamily="49" charset="-122"/>
+            </a:endParaRPr>
+          </a:p>
+          <a:p>
+            <a:pPr algn="ctr"/>
+            <a:r>
+              <a:rPr kumimoji="1" lang="zh-CN" altLang="en-US" sz="1200" dirty="0">
+                <a:solidFill>
+                  <a:schemeClr val="tx1"/>
+                </a:solidFill>
+                <a:latin typeface="KaiTi" panose="02010609060101010101" pitchFamily="49" charset="-122"/>
+                <a:ea typeface="KaiTi" panose="02010609060101010101" pitchFamily="49" charset="-122"/>
+              </a:rPr>
+              <a:t>非集舆情文本啦！</a:t>
+            </a:r>
+          </a:p>
+        </p:txBody>
+      </p:sp>
+      <p:sp>
+        <p:nvSpPr>
+          <p:cNvPr id="45" name="箭头: 右 27">
+            <a:extLst>
+              <a:ext uri="{FF2B5EF4-FFF2-40B4-BE49-F238E27FC236}">
+                <a16:creationId xmlns:a16="http://schemas.microsoft.com/office/drawing/2014/main" id="{2A6305F5-F65F-C3C4-6A9A-55320D03ABCA}"/>
+              </a:ext>
+            </a:extLst>
+          </p:cNvPr>
+          <p:cNvSpPr/>
+          <p:nvPr/>
+        </p:nvSpPr>
+        <p:spPr>
+          <a:xfrm rot="10800000">
+            <a:off x="4127625" y="5733046"/>
+            <a:ext cx="802803" cy="339692"/>
+          </a:xfrm>
+          <a:prstGeom prst="rightArrow">
+            <a:avLst/>
+          </a:prstGeom>
+          <a:solidFill>
+            <a:schemeClr val="accent4">
+              <a:lumMod val="60000"/>
+              <a:lumOff val="40000"/>
+            </a:schemeClr>
+          </a:solidFill>
+          <a:ln>
+            <a:solidFill>
+              <a:schemeClr val="accent1">
+                <a:lumMod val="60000"/>
+                <a:lumOff val="40000"/>
+              </a:schemeClr>
+            </a:solidFill>
+            <a:prstDash val="sysDash"/>
+          </a:ln>
+        </p:spPr>
+        <p:style>
+          <a:lnRef idx="2">
+            <a:schemeClr val="accent1">
+              <a:shade val="50000"/>
+            </a:schemeClr>
+          </a:lnRef>
+          <a:fillRef idx="1">
+            <a:schemeClr val="accent1"/>
+          </a:fillRef>
+          <a:effectRef idx="0">
+            <a:schemeClr val="accent1"/>
+          </a:effectRef>
+          <a:fontRef idx="minor">
+            <a:schemeClr val="lt1"/>
+          </a:fontRef>
+        </p:style>
+        <p:txBody>
+          <a:bodyPr rtlCol="0" anchor="ctr"/>
+          <a:lstStyle/>
+          <a:p>
+            <a:pPr algn="ctr"/>
+            <a:endParaRPr lang="zh-CN" altLang="en-US"/>
+          </a:p>
+        </p:txBody>
+      </p:sp>
+      <p:sp>
+        <p:nvSpPr>
+          <p:cNvPr id="46" name="文本框 45">
+            <a:extLst>
+              <a:ext uri="{FF2B5EF4-FFF2-40B4-BE49-F238E27FC236}">
+                <a16:creationId xmlns:a16="http://schemas.microsoft.com/office/drawing/2014/main" id="{013E8E5E-95B9-55E3-A784-F1D595E0D8E2}"/>
+              </a:ext>
+            </a:extLst>
+          </p:cNvPr>
+          <p:cNvSpPr txBox="1"/>
+          <p:nvPr/>
+        </p:nvSpPr>
+        <p:spPr>
+          <a:xfrm>
+            <a:off x="4305761" y="5523946"/>
+            <a:ext cx="460382" cy="253916"/>
+          </a:xfrm>
+          <a:prstGeom prst="rect">
+            <a:avLst/>
+          </a:prstGeom>
+          <a:noFill/>
+        </p:spPr>
+        <p:txBody>
+          <a:bodyPr wrap="none" rtlCol="0">
+            <a:spAutoFit/>
+          </a:bodyPr>
+          <a:lstStyle/>
+          <a:p>
+            <a:r>
+              <a:rPr lang="zh-CN" altLang="en-US" sz="1050" b="1" dirty="0">
+                <a:latin typeface="KaiTi" panose="02010609060101010101" pitchFamily="49" charset="-122"/>
+                <a:ea typeface="KaiTi" panose="02010609060101010101" pitchFamily="49" charset="-122"/>
+              </a:rPr>
+              <a:t>评估</a:t>
+            </a:r>
+          </a:p>
+        </p:txBody>
+      </p:sp>
+      <p:pic>
+        <p:nvPicPr>
+          <p:cNvPr id="50" name="图形 49" descr="哭泣的脸轮廓 纯色填充">
+            <a:extLst>
+              <a:ext uri="{FF2B5EF4-FFF2-40B4-BE49-F238E27FC236}">
+                <a16:creationId xmlns:a16="http://schemas.microsoft.com/office/drawing/2014/main" id="{D843C102-1325-3BB2-2ADC-9D170B1D7DEA}"/>
+              </a:ext>
+            </a:extLst>
+          </p:cNvPr>
+          <p:cNvPicPr>
+            <a:picLocks noChangeAspect="1"/>
+          </p:cNvPicPr>
+          <p:nvPr/>
+        </p:nvPicPr>
+        <p:blipFill>
+          <a:blip r:embed="rId22">
+            <a:extLst>
+              <a:ext uri="{96DAC541-7B7A-43D3-8B79-37D633B846F1}">
+                <asvg:svgBlip xmlns:asvg="http://schemas.microsoft.com/office/drawing/2016/SVG/main" r:embed="rId23"/>
+              </a:ext>
+            </a:extLst>
+          </a:blip>
+          <a:stretch>
+            <a:fillRect/>
+          </a:stretch>
+        </p:blipFill>
+        <p:spPr>
+          <a:xfrm>
+            <a:off x="3174323" y="5843068"/>
+            <a:ext cx="500731" cy="500731"/>
+          </a:xfrm>
+          <a:prstGeom prst="rect">
+            <a:avLst/>
+          </a:prstGeom>
+        </p:spPr>
+      </p:pic>
+      <p:pic>
+        <p:nvPicPr>
+          <p:cNvPr id="54" name="图形 53" descr="搞笑的脸轮廓 纯色填充">
+            <a:extLst>
+              <a:ext uri="{FF2B5EF4-FFF2-40B4-BE49-F238E27FC236}">
+                <a16:creationId xmlns:a16="http://schemas.microsoft.com/office/drawing/2014/main" id="{0E85607B-81B1-F449-B505-B2F6A4E6361F}"/>
+              </a:ext>
+            </a:extLst>
+          </p:cNvPr>
+          <p:cNvPicPr>
+            <a:picLocks noChangeAspect="1"/>
+          </p:cNvPicPr>
+          <p:nvPr/>
+        </p:nvPicPr>
+        <p:blipFill>
+          <a:blip r:embed="rId24">
+            <a:extLst>
+              <a:ext uri="{96DAC541-7B7A-43D3-8B79-37D633B846F1}">
+                <asvg:svgBlip xmlns:asvg="http://schemas.microsoft.com/office/drawing/2016/SVG/main" r:embed="rId25"/>
+              </a:ext>
+            </a:extLst>
+          </a:blip>
+          <a:stretch>
+            <a:fillRect/>
+          </a:stretch>
+        </p:blipFill>
+        <p:spPr>
+          <a:xfrm>
+            <a:off x="3169719" y="5362517"/>
+            <a:ext cx="509941" cy="509941"/>
+          </a:xfrm>
+          <a:prstGeom prst="rect">
+            <a:avLst/>
+          </a:prstGeom>
+        </p:spPr>
+      </p:pic>
+      <p:sp>
+        <p:nvSpPr>
+          <p:cNvPr id="55" name="文本框 54">
+            <a:extLst>
+              <a:ext uri="{FF2B5EF4-FFF2-40B4-BE49-F238E27FC236}">
+                <a16:creationId xmlns:a16="http://schemas.microsoft.com/office/drawing/2014/main" id="{3ED5CF1A-E6DC-028C-F844-E6C82F94F90C}"/>
+              </a:ext>
+            </a:extLst>
+          </p:cNvPr>
+          <p:cNvSpPr txBox="1"/>
+          <p:nvPr/>
+        </p:nvSpPr>
+        <p:spPr>
+          <a:xfrm>
+            <a:off x="1181413" y="5626780"/>
+            <a:ext cx="1762021" cy="461665"/>
+          </a:xfrm>
+          <a:prstGeom prst="rect">
+            <a:avLst/>
+          </a:prstGeom>
+          <a:noFill/>
+        </p:spPr>
+        <p:txBody>
+          <a:bodyPr wrap="none" rtlCol="0">
+            <a:spAutoFit/>
+          </a:bodyPr>
+          <a:lstStyle/>
+          <a:p>
+            <a:pPr marL="342900" indent="-342900">
+              <a:buAutoNum type="arabicPeriod"/>
+            </a:pPr>
+            <a:r>
+              <a:rPr kumimoji="1" lang="zh-CN" altLang="en-US" sz="1200" dirty="0">
+                <a:latin typeface="KaiTi" panose="02010609060101010101" pitchFamily="49" charset="-122"/>
+                <a:ea typeface="KaiTi" panose="02010609060101010101" pitchFamily="49" charset="-122"/>
+              </a:rPr>
+              <a:t>达到人类标注水平</a:t>
+            </a:r>
+            <a:endParaRPr kumimoji="1" lang="en-US" altLang="zh-CN" sz="1200" dirty="0">
+              <a:latin typeface="KaiTi" panose="02010609060101010101" pitchFamily="49" charset="-122"/>
+              <a:ea typeface="KaiTi" panose="02010609060101010101" pitchFamily="49" charset="-122"/>
+            </a:endParaRPr>
+          </a:p>
+          <a:p>
+            <a:pPr marL="342900" indent="-342900">
+              <a:buAutoNum type="arabicPeriod"/>
+            </a:pPr>
+            <a:r>
+              <a:rPr kumimoji="1" lang="zh-CN" altLang="en-US" sz="1200" dirty="0">
+                <a:latin typeface="KaiTi" panose="02010609060101010101" pitchFamily="49" charset="-122"/>
+                <a:ea typeface="KaiTi" panose="02010609060101010101" pitchFamily="49" charset="-122"/>
+              </a:rPr>
+              <a:t>超越</a:t>
+            </a:r>
+            <a:r>
+              <a:rPr kumimoji="1" lang="en-US" altLang="zh-CN" sz="1200" dirty="0">
+                <a:latin typeface="KaiTi" panose="02010609060101010101" pitchFamily="49" charset="-122"/>
+                <a:ea typeface="KaiTi" panose="02010609060101010101" pitchFamily="49" charset="-122"/>
+              </a:rPr>
+              <a:t>GPT4</a:t>
+            </a:r>
+            <a:r>
+              <a:rPr kumimoji="1" lang="zh-CN" altLang="en-US" sz="1200" dirty="0">
+                <a:latin typeface="KaiTi" panose="02010609060101010101" pitchFamily="49" charset="-122"/>
+                <a:ea typeface="KaiTi" panose="02010609060101010101" pitchFamily="49" charset="-122"/>
+              </a:rPr>
+              <a:t>标注水平</a:t>
+            </a:r>
           </a:p>
         </p:txBody>
       </p:sp>

</xml_diff>